<commit_message>
Minor copy changes to presentation
</commit_message>
<xml_diff>
--- a/SQL in the City 2012 - Ernest Hwang.pptx
+++ b/SQL in the City 2012 - Ernest Hwang.pptx
@@ -5,10 +5,10 @@
     <p:sldMasterId id="2147483684" r:id="rId1"/>
   </p:sldMasterIdLst>
   <p:notesMasterIdLst>
-    <p:notesMasterId r:id="rId22"/>
+    <p:notesMasterId r:id="rId25"/>
   </p:notesMasterIdLst>
   <p:handoutMasterIdLst>
-    <p:handoutMasterId r:id="rId23"/>
+    <p:handoutMasterId r:id="rId26"/>
   </p:handoutMasterIdLst>
   <p:sldIdLst>
     <p:sldId id="256" r:id="rId2"/>
@@ -30,7 +30,10 @@
     <p:sldId id="273" r:id="rId18"/>
     <p:sldId id="275" r:id="rId19"/>
     <p:sldId id="264" r:id="rId20"/>
-    <p:sldId id="265" r:id="rId21"/>
+    <p:sldId id="281" r:id="rId21"/>
+    <p:sldId id="279" r:id="rId22"/>
+    <p:sldId id="280" r:id="rId23"/>
+    <p:sldId id="265" r:id="rId24"/>
   </p:sldIdLst>
   <p:sldSz cx="9144000" cy="6858000" type="screen4x3"/>
   <p:notesSz cx="6858000" cy="9144000"/>
@@ -214,7 +217,7 @@
           <a:p>
             <a:fld id="{A60FB039-A863-1948-B2EE-9026332A9C0B}" type="datetimeFigureOut">
               <a:rPr lang="en-US" smtClean="0"/>
-              <a:t>10/3/2012</a:t>
+              <a:t>4/10/2013</a:t>
             </a:fld>
             <a:endParaRPr lang="en-US"/>
           </a:p>
@@ -379,7 +382,7 @@
           <a:p>
             <a:fld id="{289F0299-3019-4056-A35A-A0DF21EB2AC8}" type="datetimeFigureOut">
               <a:rPr lang="en-US" smtClean="0"/>
-              <a:t>10/3/2012</a:t>
+              <a:t>4/10/2013</a:t>
             </a:fld>
             <a:endParaRPr lang="en-US"/>
           </a:p>
@@ -695,40 +698,6 @@
               <a:buFont typeface="Arial" charset="0"/>
               <a:buChar char="•"/>
             </a:pPr>
-            <a:r>
-              <a:rPr lang="en-US" dirty="0" smtClean="0"/>
-              <a:t>Detach</a:t>
-            </a:r>
-            <a:r>
-              <a:rPr lang="en-US" baseline="0" dirty="0" smtClean="0"/>
-              <a:t> Practice Fusion databases</a:t>
-            </a:r>
-          </a:p>
-          <a:p>
-            <a:pPr marL="171450" indent="-171450">
-              <a:buFont typeface="Arial" charset="0"/>
-              <a:buChar char="•"/>
-            </a:pPr>
-            <a:r>
-              <a:rPr lang="en-US" baseline="0" dirty="0" smtClean="0"/>
-              <a:t>Turn off white space in SSMS</a:t>
-            </a:r>
-          </a:p>
-          <a:p>
-            <a:pPr marL="171450" indent="-171450">
-              <a:buFont typeface="Arial" charset="0"/>
-              <a:buChar char="•"/>
-            </a:pPr>
-            <a:r>
-              <a:rPr lang="en-US" baseline="0" dirty="0" smtClean="0"/>
-              <a:t>Turn off white space in Notepad++</a:t>
-            </a:r>
-          </a:p>
-          <a:p>
-            <a:pPr marL="171450" indent="-171450">
-              <a:buFont typeface="Arial" charset="0"/>
-              <a:buChar char="•"/>
-            </a:pPr>
             <a:endParaRPr lang="en-US" baseline="0" dirty="0" smtClean="0"/>
           </a:p>
         </p:txBody>
@@ -993,14 +962,6 @@
           <a:bodyPr/>
           <a:lstStyle/>
           <a:p>
-            <a:r>
-              <a:rPr lang="en-US" dirty="0" smtClean="0"/>
-              <a:t>Make a change to the underlying</a:t>
-            </a:r>
-            <a:r>
-              <a:rPr lang="en-US" baseline="0" dirty="0" smtClean="0"/>
-              <a:t> table, but don’t update the view that consumes the table.  The build should break!</a:t>
-            </a:r>
             <a:endParaRPr lang="en-US" dirty="0"/>
           </a:p>
         </p:txBody>
@@ -1261,19 +1222,7 @@
           <a:bodyPr/>
           <a:lstStyle/>
           <a:p>
-            <a:r>
-              <a:rPr lang="en-US" dirty="0" smtClean="0"/>
-              <a:t>Red Gate had me write up an article about</a:t>
-            </a:r>
-            <a:r>
-              <a:rPr lang="en-US" baseline="0" dirty="0" smtClean="0"/>
-              <a:t> how much money SQL Source </a:t>
-            </a:r>
-            <a:r>
-              <a:rPr lang="en-US" baseline="0" smtClean="0"/>
-              <a:t>Control saved us…</a:t>
-            </a:r>
-            <a:endParaRPr lang="en-US"/>
+            <a:endParaRPr lang="en-US" dirty="0"/>
           </a:p>
         </p:txBody>
       </p:sp>
@@ -1357,22 +1306,6 @@
           <a:bodyPr/>
           <a:lstStyle/>
           <a:p>
-            <a:r>
-              <a:rPr lang="en-US" dirty="0" smtClean="0"/>
-              <a:t>The</a:t>
-            </a:r>
-            <a:r>
-              <a:rPr lang="en-US" baseline="0" dirty="0" smtClean="0"/>
-              <a:t> entire database schema is available along with all </a:t>
-            </a:r>
-            <a:r>
-              <a:rPr lang="en-US" baseline="0" dirty="0" err="1" smtClean="0"/>
-              <a:t>MSBuild</a:t>
-            </a:r>
-            <a:r>
-              <a:rPr lang="en-US" baseline="0" dirty="0" smtClean="0"/>
-              <a:t> scripts</a:t>
-            </a:r>
             <a:endParaRPr lang="en-US" dirty="0"/>
           </a:p>
         </p:txBody>
@@ -1394,7 +1327,7 @@
           <a:p>
             <a:fld id="{E2890FE7-A50C-4C55-BEA8-0A88612DFC07}" type="slidenum">
               <a:rPr lang="en-US" smtClean="0"/>
-              <a:t>20</a:t>
+              <a:t>23</a:t>
             </a:fld>
             <a:endParaRPr lang="en-US"/>
           </a:p>
@@ -1461,155 +1394,6 @@
               <a:buFont typeface="Arial" charset="0"/>
               <a:buChar char="•"/>
             </a:pPr>
-            <a:r>
-              <a:rPr lang="en-US" dirty="0" smtClean="0"/>
-              <a:t>Practice Fusion</a:t>
-            </a:r>
-            <a:r>
-              <a:rPr lang="en-US" baseline="0" dirty="0" smtClean="0"/>
-              <a:t> – The leading provider of Electronic Health Records in the US</a:t>
-            </a:r>
-          </a:p>
-          <a:p>
-            <a:pPr marL="171450" indent="-171450">
-              <a:buFont typeface="Arial" charset="0"/>
-              <a:buChar char="•"/>
-            </a:pPr>
-            <a:r>
-              <a:rPr lang="en-US" baseline="0" dirty="0" smtClean="0"/>
-              <a:t>“</a:t>
-            </a:r>
-            <a:r>
-              <a:rPr lang="en-US" sz="1200" kern="1200" dirty="0" smtClean="0">
-                <a:solidFill>
-                  <a:schemeClr val="tx1"/>
-                </a:solidFill>
-                <a:effectLst/>
-                <a:latin typeface="+mn-lt"/>
-                <a:ea typeface="+mn-ea"/>
-                <a:cs typeface="+mn-cs"/>
-              </a:rPr>
-              <a:t>Practice Fusion is the leading web-based Electronic Health Record system for doctors and Personal Health Record for patients to manage their health online</a:t>
-            </a:r>
-            <a:r>
-              <a:rPr lang="en-US" baseline="0" dirty="0" smtClean="0"/>
-              <a:t>”</a:t>
-            </a:r>
-            <a:endParaRPr lang="en-US" dirty="0" smtClean="0"/>
-          </a:p>
-          <a:p>
-            <a:pPr marL="171450" indent="-171450">
-              <a:buFont typeface="Arial" charset="0"/>
-              <a:buChar char="•"/>
-            </a:pPr>
-            <a:endParaRPr lang="en-US" dirty="0" smtClean="0"/>
-          </a:p>
-          <a:p>
-            <a:pPr marL="171450" indent="-171450">
-              <a:buFont typeface="Arial" charset="0"/>
-              <a:buChar char="•"/>
-            </a:pPr>
-            <a:r>
-              <a:rPr lang="en-US" dirty="0" smtClean="0"/>
-              <a:t>I’m not a DBA</a:t>
-            </a:r>
-          </a:p>
-          <a:p>
-            <a:pPr marL="171450" indent="-171450">
-              <a:buFont typeface="Arial" charset="0"/>
-              <a:buChar char="•"/>
-            </a:pPr>
-            <a:r>
-              <a:rPr lang="en-US" dirty="0" smtClean="0"/>
-              <a:t>I’m not a build engineer</a:t>
-            </a:r>
-          </a:p>
-          <a:p>
-            <a:pPr marL="0" indent="0">
-              <a:buFont typeface="Arial" charset="0"/>
-              <a:buNone/>
-            </a:pPr>
-            <a:endParaRPr lang="en-US" dirty="0" smtClean="0"/>
-          </a:p>
-          <a:p>
-            <a:pPr marL="0" indent="0">
-              <a:buFont typeface="Arial" charset="0"/>
-              <a:buNone/>
-            </a:pPr>
-            <a:r>
-              <a:rPr lang="en-US" i="1" dirty="0" smtClean="0">
-                <a:solidFill>
-                  <a:schemeClr val="bg1">
-                    <a:lumMod val="75000"/>
-                  </a:schemeClr>
-                </a:solidFill>
-              </a:rPr>
-              <a:t>(Show</a:t>
-            </a:r>
-            <a:r>
-              <a:rPr lang="en-US" i="1" baseline="0" dirty="0" smtClean="0">
-                <a:solidFill>
-                  <a:schemeClr val="bg1">
-                    <a:lumMod val="75000"/>
-                  </a:schemeClr>
-                </a:solidFill>
-              </a:rPr>
-              <a:t> folder of database scripts)</a:t>
-            </a:r>
-          </a:p>
-          <a:p>
-            <a:pPr marL="0" indent="0">
-              <a:buFont typeface="Arial" charset="0"/>
-              <a:buNone/>
-            </a:pPr>
-            <a:endParaRPr lang="en-US" baseline="0" dirty="0" smtClean="0"/>
-          </a:p>
-          <a:p>
-            <a:pPr marL="0" indent="0">
-              <a:buFont typeface="Arial" charset="0"/>
-              <a:buNone/>
-            </a:pPr>
-            <a:r>
-              <a:rPr lang="en-US" baseline="0" dirty="0" smtClean="0"/>
-              <a:t>You need scripts that </a:t>
-            </a:r>
-          </a:p>
-          <a:p>
-            <a:pPr marL="171450" indent="-171450">
-              <a:buFont typeface="Arial" charset="0"/>
-              <a:buChar char="•"/>
-            </a:pPr>
-            <a:r>
-              <a:rPr lang="en-US" baseline="0" dirty="0" smtClean="0"/>
-              <a:t>Check whether they have been executed</a:t>
-            </a:r>
-          </a:p>
-          <a:p>
-            <a:pPr marL="171450" indent="-171450">
-              <a:buFont typeface="Arial" charset="0"/>
-              <a:buChar char="•"/>
-            </a:pPr>
-            <a:r>
-              <a:rPr lang="en-US" baseline="0" dirty="0" smtClean="0"/>
-              <a:t>Insert new records that aren’t there</a:t>
-            </a:r>
-          </a:p>
-          <a:p>
-            <a:pPr marL="171450" indent="-171450">
-              <a:buFont typeface="Arial" charset="0"/>
-              <a:buChar char="•"/>
-            </a:pPr>
-            <a:endParaRPr lang="en-US" baseline="0" dirty="0" smtClean="0"/>
-          </a:p>
-          <a:p>
-            <a:pPr marL="0" indent="0">
-              <a:buFont typeface="Arial" charset="0"/>
-              <a:buNone/>
-            </a:pPr>
-            <a:r>
-              <a:rPr lang="en-US" baseline="0" dirty="0" smtClean="0"/>
-              <a:t>Questions?  I’ll try to field questions as best as I can, time permitting.</a:t>
-            </a:r>
             <a:endParaRPr lang="en-US" dirty="0"/>
           </a:p>
         </p:txBody>
@@ -1694,14 +1478,6 @@
           <a:bodyPr/>
           <a:lstStyle/>
           <a:p>
-            <a:r>
-              <a:rPr lang="en-US" dirty="0" smtClean="0"/>
-              <a:t>I heard</a:t>
-            </a:r>
-            <a:r>
-              <a:rPr lang="en-US" baseline="0" dirty="0" smtClean="0"/>
-              <a:t> about the SQL in the City event and reached out to Red Gate!</a:t>
-            </a:r>
             <a:endParaRPr lang="en-US" dirty="0"/>
           </a:p>
         </p:txBody>
@@ -1790,32 +1566,7 @@
               <a:buFont typeface="Arial" charset="0"/>
               <a:buNone/>
             </a:pPr>
-            <a:r>
-              <a:rPr lang="en-US" dirty="0" smtClean="0"/>
-              <a:t>SQL</a:t>
-            </a:r>
-            <a:r>
-              <a:rPr lang="en-US" baseline="0" dirty="0" smtClean="0"/>
-              <a:t> Source Control is </a:t>
-            </a:r>
             <a:endParaRPr lang="en-US" dirty="0" smtClean="0"/>
-          </a:p>
-          <a:p>
-            <a:pPr marL="171450" indent="-171450">
-              <a:buFont typeface="Arial" charset="0"/>
-              <a:buChar char="•"/>
-            </a:pPr>
-            <a:endParaRPr lang="en-US" dirty="0" smtClean="0"/>
-          </a:p>
-          <a:p>
-            <a:pPr marL="171450" indent="-171450">
-              <a:buFont typeface="Arial" charset="0"/>
-              <a:buChar char="•"/>
-            </a:pPr>
-            <a:r>
-              <a:rPr lang="en-US" dirty="0" smtClean="0"/>
-              <a:t>Developers don’t need to maintain scripts</a:t>
-            </a:r>
           </a:p>
         </p:txBody>
       </p:sp>
@@ -1899,81 +1650,7 @@
           <a:bodyPr/>
           <a:lstStyle/>
           <a:p>
-            <a:r>
-              <a:rPr lang="en-US" dirty="0" smtClean="0"/>
-              <a:t>How many of you actively use some source control management</a:t>
-            </a:r>
-            <a:r>
-              <a:rPr lang="en-US" baseline="0" dirty="0" smtClean="0"/>
-              <a:t> system for maintaining database scripts?</a:t>
-            </a:r>
             <a:endParaRPr lang="en-US" dirty="0" smtClean="0"/>
-          </a:p>
-          <a:p>
-            <a:endParaRPr lang="en-US" dirty="0" smtClean="0"/>
-          </a:p>
-          <a:p>
-            <a:r>
-              <a:rPr lang="en-US" dirty="0" smtClean="0"/>
-              <a:t>How many</a:t>
-            </a:r>
-            <a:r>
-              <a:rPr lang="en-US" baseline="0" dirty="0" smtClean="0"/>
-              <a:t> of you are actively involved in Continuous Integration / Build Servers?</a:t>
-            </a:r>
-            <a:endParaRPr lang="en-US" dirty="0" smtClean="0"/>
-          </a:p>
-          <a:p>
-            <a:endParaRPr lang="en-US" dirty="0" smtClean="0"/>
-          </a:p>
-          <a:p>
-            <a:r>
-              <a:rPr lang="en-US" dirty="0" smtClean="0"/>
-              <a:t>How many of you are familiar with </a:t>
-            </a:r>
-            <a:r>
-              <a:rPr lang="en-US" dirty="0" err="1" smtClean="0"/>
-              <a:t>Git</a:t>
-            </a:r>
-            <a:r>
-              <a:rPr lang="en-US" dirty="0" smtClean="0"/>
-              <a:t> / GitHub?</a:t>
-            </a:r>
-          </a:p>
-          <a:p>
-            <a:endParaRPr lang="en-US" dirty="0" smtClean="0"/>
-          </a:p>
-          <a:p>
-            <a:r>
-              <a:rPr lang="en-US" dirty="0" err="1" smtClean="0"/>
-              <a:t>Git</a:t>
-            </a:r>
-            <a:r>
-              <a:rPr lang="en-US" dirty="0" smtClean="0"/>
-              <a:t> is a source control management system like SVN, TFS.</a:t>
-            </a:r>
-          </a:p>
-          <a:p>
-            <a:r>
-              <a:rPr lang="en-US" dirty="0" smtClean="0"/>
-              <a:t>GitHub is a could-based</a:t>
-            </a:r>
-            <a:r>
-              <a:rPr lang="en-US" baseline="0" dirty="0" smtClean="0"/>
-              <a:t> </a:t>
-            </a:r>
-            <a:r>
-              <a:rPr lang="en-US" dirty="0" smtClean="0"/>
-              <a:t>hosted service for </a:t>
-            </a:r>
-            <a:r>
-              <a:rPr lang="en-US" dirty="0" err="1" smtClean="0"/>
-              <a:t>Git</a:t>
-            </a:r>
-            <a:r>
-              <a:rPr lang="en-US" dirty="0" smtClean="0"/>
-              <a:t>.</a:t>
-            </a:r>
           </a:p>
         </p:txBody>
       </p:sp>
@@ -2233,39 +1910,6 @@
               <a:buFont typeface="Arial" charset="0"/>
               <a:buNone/>
             </a:pPr>
-            <a:r>
-              <a:rPr lang="en-US" dirty="0" smtClean="0"/>
-              <a:t>It’s not just a shell</a:t>
-            </a:r>
-            <a:r>
-              <a:rPr lang="en-US" baseline="0" dirty="0" smtClean="0"/>
-              <a:t> extension/plugin that interfaces with your SCM.</a:t>
-            </a:r>
-          </a:p>
-          <a:p>
-            <a:pPr marL="0" indent="0">
-              <a:buFont typeface="Arial" charset="0"/>
-              <a:buNone/>
-            </a:pPr>
-            <a:endParaRPr lang="en-US" baseline="0" dirty="0" smtClean="0"/>
-          </a:p>
-          <a:p>
-            <a:pPr marL="0" indent="0">
-              <a:buFont typeface="Arial" charset="0"/>
-              <a:buNone/>
-            </a:pPr>
-            <a:r>
-              <a:rPr lang="en-US" baseline="0" dirty="0" smtClean="0"/>
-              <a:t>It also defines a </a:t>
-            </a:r>
-            <a:r>
-              <a:rPr lang="en-US" baseline="0" dirty="0" err="1" smtClean="0"/>
-              <a:t>rebuildable</a:t>
-            </a:r>
-            <a:r>
-              <a:rPr lang="en-US" baseline="0" dirty="0" smtClean="0"/>
-              <a:t> copy of your database schema that SQL Compare and SQL Data Compare can consume.</a:t>
-            </a:r>
             <a:endParaRPr lang="en-US" dirty="0" smtClean="0"/>
           </a:p>
         </p:txBody>
@@ -2579,7 +2223,7 @@
           <a:p>
             <a:fld id="{D6E9CBC2-EFEA-824D-9B02-0FE8BCB5A938}" type="datetimeFigureOut">
               <a:rPr lang="en-US" smtClean="0"/>
-              <a:t>10/3/2012</a:t>
+              <a:t>4/10/2013</a:t>
             </a:fld>
             <a:endParaRPr lang="en-US"/>
           </a:p>
@@ -2744,7 +2388,7 @@
           <a:p>
             <a:fld id="{D6E9CBC2-EFEA-824D-9B02-0FE8BCB5A938}" type="datetimeFigureOut">
               <a:rPr lang="en-US" smtClean="0"/>
-              <a:t>10/3/2012</a:t>
+              <a:t>4/10/2013</a:t>
             </a:fld>
             <a:endParaRPr lang="en-US"/>
           </a:p>
@@ -2919,7 +2563,7 @@
           <a:p>
             <a:fld id="{D6E9CBC2-EFEA-824D-9B02-0FE8BCB5A938}" type="datetimeFigureOut">
               <a:rPr lang="en-US" smtClean="0"/>
-              <a:t>10/3/2012</a:t>
+              <a:t>4/10/2013</a:t>
             </a:fld>
             <a:endParaRPr lang="en-US"/>
           </a:p>
@@ -3084,7 +2728,7 @@
           <a:p>
             <a:fld id="{D6E9CBC2-EFEA-824D-9B02-0FE8BCB5A938}" type="datetimeFigureOut">
               <a:rPr lang="en-US" smtClean="0"/>
-              <a:t>10/3/2012</a:t>
+              <a:t>4/10/2013</a:t>
             </a:fld>
             <a:endParaRPr lang="en-US"/>
           </a:p>
@@ -3325,7 +2969,7 @@
           <a:p>
             <a:fld id="{D6E9CBC2-EFEA-824D-9B02-0FE8BCB5A938}" type="datetimeFigureOut">
               <a:rPr lang="en-US" smtClean="0"/>
-              <a:t>10/3/2012</a:t>
+              <a:t>4/10/2013</a:t>
             </a:fld>
             <a:endParaRPr lang="en-US"/>
           </a:p>
@@ -3608,7 +3252,7 @@
           <a:p>
             <a:fld id="{D6E9CBC2-EFEA-824D-9B02-0FE8BCB5A938}" type="datetimeFigureOut">
               <a:rPr lang="en-US" smtClean="0"/>
-              <a:t>10/3/2012</a:t>
+              <a:t>4/10/2013</a:t>
             </a:fld>
             <a:endParaRPr lang="en-US"/>
           </a:p>
@@ -4025,7 +3669,7 @@
           <a:p>
             <a:fld id="{D6E9CBC2-EFEA-824D-9B02-0FE8BCB5A938}" type="datetimeFigureOut">
               <a:rPr lang="en-US" smtClean="0"/>
-              <a:t>10/3/2012</a:t>
+              <a:t>4/10/2013</a:t>
             </a:fld>
             <a:endParaRPr lang="en-US"/>
           </a:p>
@@ -4138,7 +3782,7 @@
           <a:p>
             <a:fld id="{D6E9CBC2-EFEA-824D-9B02-0FE8BCB5A938}" type="datetimeFigureOut">
               <a:rPr lang="en-US" smtClean="0"/>
-              <a:t>10/3/2012</a:t>
+              <a:t>4/10/2013</a:t>
             </a:fld>
             <a:endParaRPr lang="en-US"/>
           </a:p>
@@ -4228,7 +3872,7 @@
           <a:p>
             <a:fld id="{D6E9CBC2-EFEA-824D-9B02-0FE8BCB5A938}" type="datetimeFigureOut">
               <a:rPr lang="en-US" smtClean="0"/>
-              <a:t>10/3/2012</a:t>
+              <a:t>4/10/2013</a:t>
             </a:fld>
             <a:endParaRPr lang="en-US"/>
           </a:p>
@@ -4500,7 +4144,7 @@
           <a:p>
             <a:fld id="{D6E9CBC2-EFEA-824D-9B02-0FE8BCB5A938}" type="datetimeFigureOut">
               <a:rPr lang="en-US" smtClean="0"/>
-              <a:t>10/3/2012</a:t>
+              <a:t>4/10/2013</a:t>
             </a:fld>
             <a:endParaRPr lang="en-US"/>
           </a:p>
@@ -4752,7 +4396,7 @@
           <a:p>
             <a:fld id="{D6E9CBC2-EFEA-824D-9B02-0FE8BCB5A938}" type="datetimeFigureOut">
               <a:rPr lang="en-US" smtClean="0"/>
-              <a:t>10/3/2012</a:t>
+              <a:t>4/10/2013</a:t>
             </a:fld>
             <a:endParaRPr lang="en-US"/>
           </a:p>
@@ -4967,7 +4611,7 @@
           <a:p>
             <a:fld id="{D6E9CBC2-EFEA-824D-9B02-0FE8BCB5A938}" type="datetimeFigureOut">
               <a:rPr lang="en-US" smtClean="0"/>
-              <a:t>10/3/2012</a:t>
+              <a:t>4/10/2013</a:t>
             </a:fld>
             <a:endParaRPr lang="en-US"/>
           </a:p>
@@ -5392,18 +5036,22 @@
         </p:spPr>
         <p:txBody>
           <a:bodyPr>
-            <a:normAutofit fontScale="90000"/>
+            <a:normAutofit/>
           </a:bodyPr>
           <a:lstStyle/>
           <a:p>
             <a:r>
-              <a:rPr lang="en-US" sz="4000" dirty="0"/>
-              <a:t>Case Study: Why You Should Source Control Your Database</a:t>
-            </a:r>
-            <a:endParaRPr lang="en-US" sz="4000" b="1" dirty="0">
-              <a:latin typeface="Arial"/>
-              <a:cs typeface="Arial"/>
-            </a:endParaRPr>
+              <a:rPr lang="en-US" sz="2800" dirty="0" smtClean="0"/>
+              <a:t>SQL Server Continuous Integration</a:t>
+            </a:r>
+            <a:br>
+              <a:rPr lang="en-US" sz="2800" dirty="0" smtClean="0"/>
+            </a:br>
+            <a:r>
+              <a:rPr lang="en-US" sz="2800" dirty="0" smtClean="0"/>
+              <a:t>using Jenkins and Red Gate</a:t>
+            </a:r>
+            <a:endParaRPr lang="en-US" sz="2800" b="1" dirty="0"/>
           </a:p>
         </p:txBody>
       </p:sp>
@@ -10996,6 +10644,1270 @@
           <a:lstStyle/>
           <a:p>
             <a:r>
+              <a:rPr lang="en-GB" dirty="0" smtClean="0"/>
+              <a:t>Considerations</a:t>
+            </a:r>
+            <a:endParaRPr lang="en-US" dirty="0"/>
+          </a:p>
+        </p:txBody>
+      </p:sp>
+      <p:sp>
+        <p:nvSpPr>
+          <p:cNvPr id="3" name="Content Placeholder 2"/>
+          <p:cNvSpPr>
+            <a:spLocks noGrp="1"/>
+          </p:cNvSpPr>
+          <p:nvPr>
+            <p:ph idx="1"/>
+          </p:nvPr>
+        </p:nvSpPr>
+        <p:spPr>
+          <a:xfrm>
+            <a:off x="457200" y="1600201"/>
+            <a:ext cx="8229600" cy="3450802"/>
+          </a:xfrm>
+        </p:spPr>
+        <p:txBody>
+          <a:bodyPr>
+            <a:normAutofit/>
+          </a:bodyPr>
+          <a:lstStyle/>
+          <a:p>
+            <a:pPr>
+              <a:buFont typeface="Arial" charset="0"/>
+              <a:buChar char="•"/>
+            </a:pPr>
+            <a:r>
+              <a:rPr lang="en-US" sz="2400" dirty="0" smtClean="0">
+                <a:latin typeface="Arial"/>
+                <a:cs typeface="Arial"/>
+              </a:rPr>
+              <a:t>Environments must be pristine</a:t>
+            </a:r>
+          </a:p>
+          <a:p>
+            <a:pPr>
+              <a:buFont typeface="Arial" charset="0"/>
+              <a:buChar char="•"/>
+            </a:pPr>
+            <a:r>
+              <a:rPr lang="en-US" sz="2400" dirty="0" smtClean="0">
+                <a:latin typeface="Arial"/>
+                <a:cs typeface="Arial"/>
+              </a:rPr>
+              <a:t>Process must be changed and understood</a:t>
+            </a:r>
+          </a:p>
+          <a:p>
+            <a:pPr>
+              <a:buFont typeface="Arial" charset="0"/>
+              <a:buChar char="•"/>
+            </a:pPr>
+            <a:r>
+              <a:rPr lang="en-US" sz="2400" dirty="0" smtClean="0">
+                <a:latin typeface="Arial"/>
+                <a:cs typeface="Arial"/>
+              </a:rPr>
+              <a:t>Production change scripts should be scrutinized (especially for the first few releases)</a:t>
+            </a:r>
+          </a:p>
+          <a:p>
+            <a:pPr>
+              <a:buFont typeface="Arial" charset="0"/>
+              <a:buChar char="•"/>
+            </a:pPr>
+            <a:r>
+              <a:rPr lang="en-US" sz="2400" dirty="0" smtClean="0">
+                <a:latin typeface="Arial"/>
+                <a:cs typeface="Arial"/>
+              </a:rPr>
+              <a:t>Migration Scripts can be used to massage data</a:t>
+            </a:r>
+          </a:p>
+          <a:p>
+            <a:pPr>
+              <a:buFont typeface="Arial" charset="0"/>
+              <a:buChar char="•"/>
+            </a:pPr>
+            <a:r>
+              <a:rPr lang="en-US" sz="2400" dirty="0" smtClean="0">
+                <a:latin typeface="Arial"/>
+                <a:cs typeface="Arial"/>
+              </a:rPr>
+              <a:t>DB Replication requires more work for promotions</a:t>
+            </a:r>
+          </a:p>
+          <a:p>
+            <a:pPr>
+              <a:buFont typeface="Arial" charset="0"/>
+              <a:buChar char="•"/>
+            </a:pPr>
+            <a:endParaRPr lang="en-US" sz="2400" dirty="0" smtClean="0">
+              <a:latin typeface="Arial"/>
+              <a:cs typeface="Arial"/>
+            </a:endParaRPr>
+          </a:p>
+        </p:txBody>
+      </p:sp>
+      <p:sp>
+        <p:nvSpPr>
+          <p:cNvPr id="5" name="Subtitle 4"/>
+          <p:cNvSpPr txBox="1">
+            <a:spLocks/>
+          </p:cNvSpPr>
+          <p:nvPr/>
+        </p:nvSpPr>
+        <p:spPr>
+          <a:xfrm>
+            <a:off x="8028102" y="157880"/>
+            <a:ext cx="816516" cy="409189"/>
+          </a:xfrm>
+          <a:prstGeom prst="rect">
+            <a:avLst/>
+          </a:prstGeom>
+        </p:spPr>
+        <p:txBody>
+          <a:bodyPr vert="horz" lIns="91440" tIns="45720" rIns="91440" bIns="45720" rtlCol="0">
+            <a:normAutofit/>
+          </a:bodyPr>
+          <a:lstStyle>
+            <a:lvl1pPr marL="342900" indent="-342900" algn="l" defTabSz="457200" rtl="0" eaLnBrk="1" latinLnBrk="0" hangingPunct="1">
+              <a:spcBef>
+                <a:spcPct val="20000"/>
+              </a:spcBef>
+              <a:buFont typeface="Arial"/>
+              <a:buChar char="•"/>
+              <a:defRPr sz="2800" kern="1200">
+                <a:solidFill>
+                  <a:schemeClr val="tx1"/>
+                </a:solidFill>
+                <a:latin typeface="+mn-lt"/>
+                <a:ea typeface="+mn-ea"/>
+                <a:cs typeface="+mn-cs"/>
+              </a:defRPr>
+            </a:lvl1pPr>
+            <a:lvl2pPr marL="742950" indent="-285750" algn="l" defTabSz="457200" rtl="0" eaLnBrk="1" latinLnBrk="0" hangingPunct="1">
+              <a:spcBef>
+                <a:spcPct val="20000"/>
+              </a:spcBef>
+              <a:buFont typeface="Arial"/>
+              <a:buChar char="–"/>
+              <a:defRPr sz="2800" kern="1200">
+                <a:solidFill>
+                  <a:schemeClr val="tx1"/>
+                </a:solidFill>
+                <a:latin typeface="+mn-lt"/>
+                <a:ea typeface="+mn-ea"/>
+                <a:cs typeface="+mn-cs"/>
+              </a:defRPr>
+            </a:lvl2pPr>
+            <a:lvl3pPr marL="1143000" indent="-228600" algn="l" defTabSz="457200" rtl="0" eaLnBrk="1" latinLnBrk="0" hangingPunct="1">
+              <a:spcBef>
+                <a:spcPct val="20000"/>
+              </a:spcBef>
+              <a:buFont typeface="Arial"/>
+              <a:buChar char="•"/>
+              <a:defRPr sz="2400" kern="1200">
+                <a:solidFill>
+                  <a:schemeClr val="tx1"/>
+                </a:solidFill>
+                <a:latin typeface="+mn-lt"/>
+                <a:ea typeface="+mn-ea"/>
+                <a:cs typeface="+mn-cs"/>
+              </a:defRPr>
+            </a:lvl3pPr>
+            <a:lvl4pPr marL="1600200" indent="-228600" algn="l" defTabSz="457200" rtl="0" eaLnBrk="1" latinLnBrk="0" hangingPunct="1">
+              <a:spcBef>
+                <a:spcPct val="20000"/>
+              </a:spcBef>
+              <a:buFont typeface="Arial"/>
+              <a:buChar char="–"/>
+              <a:defRPr sz="2000" kern="1200">
+                <a:solidFill>
+                  <a:schemeClr val="tx1"/>
+                </a:solidFill>
+                <a:latin typeface="+mn-lt"/>
+                <a:ea typeface="+mn-ea"/>
+                <a:cs typeface="+mn-cs"/>
+              </a:defRPr>
+            </a:lvl4pPr>
+            <a:lvl5pPr marL="2057400" indent="-228600" algn="l" defTabSz="457200" rtl="0" eaLnBrk="1" latinLnBrk="0" hangingPunct="1">
+              <a:spcBef>
+                <a:spcPct val="20000"/>
+              </a:spcBef>
+              <a:buFont typeface="Arial"/>
+              <a:buChar char="»"/>
+              <a:defRPr sz="2000" kern="1200">
+                <a:solidFill>
+                  <a:schemeClr val="tx1"/>
+                </a:solidFill>
+                <a:latin typeface="+mn-lt"/>
+                <a:ea typeface="+mn-ea"/>
+                <a:cs typeface="+mn-cs"/>
+              </a:defRPr>
+            </a:lvl5pPr>
+            <a:lvl6pPr marL="2514600" indent="-228600" algn="l" defTabSz="457200" rtl="0" eaLnBrk="1" latinLnBrk="0" hangingPunct="1">
+              <a:spcBef>
+                <a:spcPct val="20000"/>
+              </a:spcBef>
+              <a:buFont typeface="Arial"/>
+              <a:buChar char="•"/>
+              <a:defRPr sz="2000" kern="1200">
+                <a:solidFill>
+                  <a:schemeClr val="tx1"/>
+                </a:solidFill>
+                <a:latin typeface="+mn-lt"/>
+                <a:ea typeface="+mn-ea"/>
+                <a:cs typeface="+mn-cs"/>
+              </a:defRPr>
+            </a:lvl6pPr>
+            <a:lvl7pPr marL="2971800" indent="-228600" algn="l" defTabSz="457200" rtl="0" eaLnBrk="1" latinLnBrk="0" hangingPunct="1">
+              <a:spcBef>
+                <a:spcPct val="20000"/>
+              </a:spcBef>
+              <a:buFont typeface="Arial"/>
+              <a:buChar char="•"/>
+              <a:defRPr sz="2000" kern="1200">
+                <a:solidFill>
+                  <a:schemeClr val="tx1"/>
+                </a:solidFill>
+                <a:latin typeface="+mn-lt"/>
+                <a:ea typeface="+mn-ea"/>
+                <a:cs typeface="+mn-cs"/>
+              </a:defRPr>
+            </a:lvl7pPr>
+            <a:lvl8pPr marL="3429000" indent="-228600" algn="l" defTabSz="457200" rtl="0" eaLnBrk="1" latinLnBrk="0" hangingPunct="1">
+              <a:spcBef>
+                <a:spcPct val="20000"/>
+              </a:spcBef>
+              <a:buFont typeface="Arial"/>
+              <a:buChar char="•"/>
+              <a:defRPr sz="2000" kern="1200">
+                <a:solidFill>
+                  <a:schemeClr val="tx1"/>
+                </a:solidFill>
+                <a:latin typeface="+mn-lt"/>
+                <a:ea typeface="+mn-ea"/>
+                <a:cs typeface="+mn-cs"/>
+              </a:defRPr>
+            </a:lvl8pPr>
+            <a:lvl9pPr marL="3886200" indent="-228600" algn="l" defTabSz="457200" rtl="0" eaLnBrk="1" latinLnBrk="0" hangingPunct="1">
+              <a:spcBef>
+                <a:spcPct val="20000"/>
+              </a:spcBef>
+              <a:buFont typeface="Arial"/>
+              <a:buChar char="•"/>
+              <a:defRPr sz="2000" kern="1200">
+                <a:solidFill>
+                  <a:schemeClr val="tx1"/>
+                </a:solidFill>
+                <a:latin typeface="+mn-lt"/>
+                <a:ea typeface="+mn-ea"/>
+                <a:cs typeface="+mn-cs"/>
+              </a:defRPr>
+            </a:lvl9pPr>
+          </a:lstStyle>
+          <a:p>
+            <a:pPr marL="0" indent="0">
+              <a:buNone/>
+            </a:pPr>
+            <a:r>
+              <a:rPr lang="en-US" sz="1600" dirty="0">
+                <a:solidFill>
+                  <a:schemeClr val="tx1">
+                    <a:lumMod val="75000"/>
+                    <a:lumOff val="25000"/>
+                  </a:schemeClr>
+                </a:solidFill>
+              </a:rPr>
+              <a:t>#sqlcity</a:t>
+            </a:r>
+            <a:endParaRPr lang="en-US" sz="1600" dirty="0">
+              <a:solidFill>
+                <a:schemeClr val="tx1">
+                  <a:lumMod val="75000"/>
+                  <a:lumOff val="25000"/>
+                </a:schemeClr>
+              </a:solidFill>
+              <a:latin typeface="Arial"/>
+              <a:cs typeface="Arial"/>
+            </a:endParaRPr>
+          </a:p>
+        </p:txBody>
+      </p:sp>
+    </p:spTree>
+    <p:extLst>
+      <p:ext uri="{BB962C8B-B14F-4D97-AF65-F5344CB8AC3E}">
+        <p14:creationId xmlns:p14="http://schemas.microsoft.com/office/powerpoint/2010/main" val="3165946523"/>
+      </p:ext>
+    </p:extLst>
+  </p:cSld>
+  <p:clrMapOvr>
+    <a:masterClrMapping/>
+  </p:clrMapOvr>
+  <p:timing>
+    <p:tnLst>
+      <p:par>
+        <p:cTn id="1" dur="indefinite" restart="never" nodeType="tmRoot"/>
+      </p:par>
+    </p:tnLst>
+  </p:timing>
+</p:sld>
+</file>
+
+<file path=ppt/slides/slide21.xml><?xml version="1.0" encoding="utf-8"?>
+<p:sld xmlns:a="http://schemas.openxmlformats.org/drawingml/2006/main" xmlns:r="http://schemas.openxmlformats.org/officeDocument/2006/relationships" xmlns:p="http://schemas.openxmlformats.org/presentationml/2006/main">
+  <p:cSld>
+    <p:spTree>
+      <p:nvGrpSpPr>
+        <p:cNvPr id="1" name=""/>
+        <p:cNvGrpSpPr/>
+        <p:nvPr/>
+      </p:nvGrpSpPr>
+      <p:grpSpPr>
+        <a:xfrm>
+          <a:off x="0" y="0"/>
+          <a:ext cx="0" cy="0"/>
+          <a:chOff x="0" y="0"/>
+          <a:chExt cx="0" cy="0"/>
+        </a:xfrm>
+      </p:grpSpPr>
+      <p:sp>
+        <p:nvSpPr>
+          <p:cNvPr id="2" name="Title 1"/>
+          <p:cNvSpPr>
+            <a:spLocks noGrp="1"/>
+          </p:cNvSpPr>
+          <p:nvPr>
+            <p:ph type="title"/>
+          </p:nvPr>
+        </p:nvSpPr>
+        <p:spPr/>
+        <p:txBody>
+          <a:bodyPr/>
+          <a:lstStyle/>
+          <a:p>
+            <a:r>
+              <a:rPr lang="en-GB" dirty="0" smtClean="0"/>
+              <a:t>Appendix 1: Other CI Servers</a:t>
+            </a:r>
+            <a:endParaRPr lang="en-US" dirty="0"/>
+          </a:p>
+        </p:txBody>
+      </p:sp>
+      <p:sp>
+        <p:nvSpPr>
+          <p:cNvPr id="3" name="Content Placeholder 2"/>
+          <p:cNvSpPr>
+            <a:spLocks noGrp="1"/>
+          </p:cNvSpPr>
+          <p:nvPr>
+            <p:ph idx="1"/>
+          </p:nvPr>
+        </p:nvSpPr>
+        <p:spPr>
+          <a:xfrm>
+            <a:off x="457200" y="1600201"/>
+            <a:ext cx="8229600" cy="3450802"/>
+          </a:xfrm>
+        </p:spPr>
+        <p:txBody>
+          <a:bodyPr>
+            <a:normAutofit/>
+          </a:bodyPr>
+          <a:lstStyle/>
+          <a:p>
+            <a:pPr>
+              <a:buFont typeface="Arial" charset="0"/>
+              <a:buChar char="•"/>
+            </a:pPr>
+            <a:r>
+              <a:rPr lang="en-US" sz="2400" dirty="0" smtClean="0">
+                <a:latin typeface="Arial"/>
+                <a:cs typeface="Arial"/>
+              </a:rPr>
+              <a:t>       Jenkins (open source)</a:t>
+            </a:r>
+          </a:p>
+          <a:p>
+            <a:pPr>
+              <a:buFont typeface="Arial" charset="0"/>
+              <a:buChar char="•"/>
+            </a:pPr>
+            <a:r>
+              <a:rPr lang="en-US" sz="2400" dirty="0" smtClean="0">
+                <a:latin typeface="Arial"/>
+                <a:cs typeface="Arial"/>
+              </a:rPr>
+              <a:t>       Team City (</a:t>
+            </a:r>
+            <a:r>
+              <a:rPr lang="en-US" sz="2400" dirty="0" err="1" smtClean="0">
+                <a:latin typeface="Arial"/>
+                <a:cs typeface="Arial"/>
+              </a:rPr>
+              <a:t>JetBrains</a:t>
+            </a:r>
+            <a:r>
+              <a:rPr lang="en-US" sz="2400" dirty="0" smtClean="0">
+                <a:latin typeface="Arial"/>
+                <a:cs typeface="Arial"/>
+              </a:rPr>
+              <a:t>)</a:t>
+            </a:r>
+          </a:p>
+          <a:p>
+            <a:pPr>
+              <a:buFont typeface="Arial" charset="0"/>
+              <a:buChar char="•"/>
+            </a:pPr>
+            <a:r>
+              <a:rPr lang="en-US" sz="2400" dirty="0" smtClean="0">
+                <a:latin typeface="Arial"/>
+                <a:cs typeface="Arial"/>
+              </a:rPr>
+              <a:t>       Bamboo (</a:t>
+            </a:r>
+            <a:r>
+              <a:rPr lang="en-US" sz="2400" dirty="0" err="1" smtClean="0">
+                <a:latin typeface="Arial"/>
+                <a:cs typeface="Arial"/>
+              </a:rPr>
+              <a:t>Atlassian</a:t>
+            </a:r>
+            <a:r>
+              <a:rPr lang="en-US" sz="2400" dirty="0" smtClean="0">
+                <a:latin typeface="Arial"/>
+                <a:cs typeface="Arial"/>
+              </a:rPr>
+              <a:t>)</a:t>
+            </a:r>
+          </a:p>
+          <a:p>
+            <a:pPr>
+              <a:buFont typeface="Arial" charset="0"/>
+              <a:buChar char="•"/>
+            </a:pPr>
+            <a:r>
+              <a:rPr lang="en-US" sz="2400" dirty="0" smtClean="0">
+                <a:latin typeface="Arial"/>
+                <a:cs typeface="Arial"/>
+              </a:rPr>
+              <a:t>       </a:t>
+            </a:r>
+            <a:r>
+              <a:rPr lang="en-US" sz="2400" dirty="0" err="1" smtClean="0">
+                <a:latin typeface="Arial"/>
+                <a:cs typeface="Arial"/>
+              </a:rPr>
+              <a:t>CruiseControl</a:t>
+            </a:r>
+            <a:r>
+              <a:rPr lang="en-US" sz="2400" dirty="0" smtClean="0">
+                <a:latin typeface="Arial"/>
+                <a:cs typeface="Arial"/>
+              </a:rPr>
+              <a:t> / CruiseControl.NET (open source)</a:t>
+            </a:r>
+            <a:endParaRPr lang="en-US" sz="2400" dirty="0">
+              <a:latin typeface="Arial"/>
+              <a:cs typeface="Arial"/>
+            </a:endParaRPr>
+          </a:p>
+        </p:txBody>
+      </p:sp>
+      <p:sp>
+        <p:nvSpPr>
+          <p:cNvPr id="5" name="Subtitle 4"/>
+          <p:cNvSpPr txBox="1">
+            <a:spLocks/>
+          </p:cNvSpPr>
+          <p:nvPr/>
+        </p:nvSpPr>
+        <p:spPr>
+          <a:xfrm>
+            <a:off x="8028102" y="157880"/>
+            <a:ext cx="816516" cy="409189"/>
+          </a:xfrm>
+          <a:prstGeom prst="rect">
+            <a:avLst/>
+          </a:prstGeom>
+        </p:spPr>
+        <p:txBody>
+          <a:bodyPr vert="horz" lIns="91440" tIns="45720" rIns="91440" bIns="45720" rtlCol="0">
+            <a:normAutofit/>
+          </a:bodyPr>
+          <a:lstStyle>
+            <a:lvl1pPr marL="342900" indent="-342900" algn="l" defTabSz="457200" rtl="0" eaLnBrk="1" latinLnBrk="0" hangingPunct="1">
+              <a:spcBef>
+                <a:spcPct val="20000"/>
+              </a:spcBef>
+              <a:buFont typeface="Arial"/>
+              <a:buChar char="•"/>
+              <a:defRPr sz="2800" kern="1200">
+                <a:solidFill>
+                  <a:schemeClr val="tx1"/>
+                </a:solidFill>
+                <a:latin typeface="+mn-lt"/>
+                <a:ea typeface="+mn-ea"/>
+                <a:cs typeface="+mn-cs"/>
+              </a:defRPr>
+            </a:lvl1pPr>
+            <a:lvl2pPr marL="742950" indent="-285750" algn="l" defTabSz="457200" rtl="0" eaLnBrk="1" latinLnBrk="0" hangingPunct="1">
+              <a:spcBef>
+                <a:spcPct val="20000"/>
+              </a:spcBef>
+              <a:buFont typeface="Arial"/>
+              <a:buChar char="–"/>
+              <a:defRPr sz="2800" kern="1200">
+                <a:solidFill>
+                  <a:schemeClr val="tx1"/>
+                </a:solidFill>
+                <a:latin typeface="+mn-lt"/>
+                <a:ea typeface="+mn-ea"/>
+                <a:cs typeface="+mn-cs"/>
+              </a:defRPr>
+            </a:lvl2pPr>
+            <a:lvl3pPr marL="1143000" indent="-228600" algn="l" defTabSz="457200" rtl="0" eaLnBrk="1" latinLnBrk="0" hangingPunct="1">
+              <a:spcBef>
+                <a:spcPct val="20000"/>
+              </a:spcBef>
+              <a:buFont typeface="Arial"/>
+              <a:buChar char="•"/>
+              <a:defRPr sz="2400" kern="1200">
+                <a:solidFill>
+                  <a:schemeClr val="tx1"/>
+                </a:solidFill>
+                <a:latin typeface="+mn-lt"/>
+                <a:ea typeface="+mn-ea"/>
+                <a:cs typeface="+mn-cs"/>
+              </a:defRPr>
+            </a:lvl3pPr>
+            <a:lvl4pPr marL="1600200" indent="-228600" algn="l" defTabSz="457200" rtl="0" eaLnBrk="1" latinLnBrk="0" hangingPunct="1">
+              <a:spcBef>
+                <a:spcPct val="20000"/>
+              </a:spcBef>
+              <a:buFont typeface="Arial"/>
+              <a:buChar char="–"/>
+              <a:defRPr sz="2000" kern="1200">
+                <a:solidFill>
+                  <a:schemeClr val="tx1"/>
+                </a:solidFill>
+                <a:latin typeface="+mn-lt"/>
+                <a:ea typeface="+mn-ea"/>
+                <a:cs typeface="+mn-cs"/>
+              </a:defRPr>
+            </a:lvl4pPr>
+            <a:lvl5pPr marL="2057400" indent="-228600" algn="l" defTabSz="457200" rtl="0" eaLnBrk="1" latinLnBrk="0" hangingPunct="1">
+              <a:spcBef>
+                <a:spcPct val="20000"/>
+              </a:spcBef>
+              <a:buFont typeface="Arial"/>
+              <a:buChar char="»"/>
+              <a:defRPr sz="2000" kern="1200">
+                <a:solidFill>
+                  <a:schemeClr val="tx1"/>
+                </a:solidFill>
+                <a:latin typeface="+mn-lt"/>
+                <a:ea typeface="+mn-ea"/>
+                <a:cs typeface="+mn-cs"/>
+              </a:defRPr>
+            </a:lvl5pPr>
+            <a:lvl6pPr marL="2514600" indent="-228600" algn="l" defTabSz="457200" rtl="0" eaLnBrk="1" latinLnBrk="0" hangingPunct="1">
+              <a:spcBef>
+                <a:spcPct val="20000"/>
+              </a:spcBef>
+              <a:buFont typeface="Arial"/>
+              <a:buChar char="•"/>
+              <a:defRPr sz="2000" kern="1200">
+                <a:solidFill>
+                  <a:schemeClr val="tx1"/>
+                </a:solidFill>
+                <a:latin typeface="+mn-lt"/>
+                <a:ea typeface="+mn-ea"/>
+                <a:cs typeface="+mn-cs"/>
+              </a:defRPr>
+            </a:lvl6pPr>
+            <a:lvl7pPr marL="2971800" indent="-228600" algn="l" defTabSz="457200" rtl="0" eaLnBrk="1" latinLnBrk="0" hangingPunct="1">
+              <a:spcBef>
+                <a:spcPct val="20000"/>
+              </a:spcBef>
+              <a:buFont typeface="Arial"/>
+              <a:buChar char="•"/>
+              <a:defRPr sz="2000" kern="1200">
+                <a:solidFill>
+                  <a:schemeClr val="tx1"/>
+                </a:solidFill>
+                <a:latin typeface="+mn-lt"/>
+                <a:ea typeface="+mn-ea"/>
+                <a:cs typeface="+mn-cs"/>
+              </a:defRPr>
+            </a:lvl7pPr>
+            <a:lvl8pPr marL="3429000" indent="-228600" algn="l" defTabSz="457200" rtl="0" eaLnBrk="1" latinLnBrk="0" hangingPunct="1">
+              <a:spcBef>
+                <a:spcPct val="20000"/>
+              </a:spcBef>
+              <a:buFont typeface="Arial"/>
+              <a:buChar char="•"/>
+              <a:defRPr sz="2000" kern="1200">
+                <a:solidFill>
+                  <a:schemeClr val="tx1"/>
+                </a:solidFill>
+                <a:latin typeface="+mn-lt"/>
+                <a:ea typeface="+mn-ea"/>
+                <a:cs typeface="+mn-cs"/>
+              </a:defRPr>
+            </a:lvl8pPr>
+            <a:lvl9pPr marL="3886200" indent="-228600" algn="l" defTabSz="457200" rtl="0" eaLnBrk="1" latinLnBrk="0" hangingPunct="1">
+              <a:spcBef>
+                <a:spcPct val="20000"/>
+              </a:spcBef>
+              <a:buFont typeface="Arial"/>
+              <a:buChar char="•"/>
+              <a:defRPr sz="2000" kern="1200">
+                <a:solidFill>
+                  <a:schemeClr val="tx1"/>
+                </a:solidFill>
+                <a:latin typeface="+mn-lt"/>
+                <a:ea typeface="+mn-ea"/>
+                <a:cs typeface="+mn-cs"/>
+              </a:defRPr>
+            </a:lvl9pPr>
+          </a:lstStyle>
+          <a:p>
+            <a:pPr marL="0" indent="0">
+              <a:buNone/>
+            </a:pPr>
+            <a:r>
+              <a:rPr lang="en-US" sz="1600" dirty="0">
+                <a:solidFill>
+                  <a:schemeClr val="tx1">
+                    <a:lumMod val="75000"/>
+                    <a:lumOff val="25000"/>
+                  </a:schemeClr>
+                </a:solidFill>
+              </a:rPr>
+              <a:t>#sqlcity</a:t>
+            </a:r>
+            <a:endParaRPr lang="en-US" sz="1600" dirty="0">
+              <a:solidFill>
+                <a:schemeClr val="tx1">
+                  <a:lumMod val="75000"/>
+                  <a:lumOff val="25000"/>
+                </a:schemeClr>
+              </a:solidFill>
+              <a:latin typeface="Arial"/>
+              <a:cs typeface="Arial"/>
+            </a:endParaRPr>
+          </a:p>
+        </p:txBody>
+      </p:sp>
+      <p:pic>
+        <p:nvPicPr>
+          <p:cNvPr id="1026" name="Picture 2"/>
+          <p:cNvPicPr>
+            <a:picLocks noChangeAspect="1" noChangeArrowheads="1"/>
+          </p:cNvPicPr>
+          <p:nvPr/>
+        </p:nvPicPr>
+        <p:blipFill>
+          <a:blip r:embed="rId2">
+            <a:extLst>
+              <a:ext uri="{28A0092B-C50C-407E-A947-70E740481C1C}">
+                <a14:useLocalDpi xmlns:a14="http://schemas.microsoft.com/office/drawing/2010/main" val="0"/>
+              </a:ext>
+            </a:extLst>
+          </a:blip>
+          <a:srcRect/>
+          <a:stretch>
+            <a:fillRect/>
+          </a:stretch>
+        </p:blipFill>
+        <p:spPr bwMode="auto">
+          <a:xfrm>
+            <a:off x="921942" y="2072420"/>
+            <a:ext cx="474261" cy="399170"/>
+          </a:xfrm>
+          <a:prstGeom prst="rect">
+            <a:avLst/>
+          </a:prstGeom>
+          <a:noFill/>
+          <a:ln>
+            <a:noFill/>
+          </a:ln>
+          <a:extLst>
+            <a:ext uri="{909E8E84-426E-40DD-AFC4-6F175D3DCCD1}">
+              <a14:hiddenFill xmlns:a14="http://schemas.microsoft.com/office/drawing/2010/main">
+                <a:solidFill>
+                  <a:schemeClr val="accent1"/>
+                </a:solidFill>
+              </a14:hiddenFill>
+            </a:ext>
+            <a:ext uri="{91240B29-F687-4F45-9708-019B960494DF}">
+              <a14:hiddenLine xmlns:a14="http://schemas.microsoft.com/office/drawing/2010/main" w="9525">
+                <a:solidFill>
+                  <a:schemeClr val="tx1"/>
+                </a:solidFill>
+                <a:miter lim="800000"/>
+                <a:headEnd/>
+                <a:tailEnd/>
+              </a14:hiddenLine>
+            </a:ext>
+          </a:extLst>
+        </p:spPr>
+      </p:pic>
+      <p:pic>
+        <p:nvPicPr>
+          <p:cNvPr id="19" name="Picture 18"/>
+          <p:cNvPicPr>
+            <a:picLocks noChangeAspect="1"/>
+          </p:cNvPicPr>
+          <p:nvPr/>
+        </p:nvPicPr>
+        <p:blipFill>
+          <a:blip r:embed="rId3">
+            <a:extLst>
+              <a:ext uri="{28A0092B-C50C-407E-A947-70E740481C1C}">
+                <a14:useLocalDpi xmlns:a14="http://schemas.microsoft.com/office/drawing/2010/main" val="0"/>
+              </a:ext>
+            </a:extLst>
+          </a:blip>
+          <a:stretch>
+            <a:fillRect/>
+          </a:stretch>
+        </p:blipFill>
+        <p:spPr>
+          <a:xfrm>
+            <a:off x="985313" y="1622072"/>
+            <a:ext cx="339092" cy="469230"/>
+          </a:xfrm>
+          <a:prstGeom prst="rect">
+            <a:avLst/>
+          </a:prstGeom>
+        </p:spPr>
+      </p:pic>
+      <p:pic>
+        <p:nvPicPr>
+          <p:cNvPr id="1027" name="Picture 3"/>
+          <p:cNvPicPr>
+            <a:picLocks noChangeAspect="1" noChangeArrowheads="1"/>
+          </p:cNvPicPr>
+          <p:nvPr/>
+        </p:nvPicPr>
+        <p:blipFill>
+          <a:blip r:embed="rId4">
+            <a:extLst>
+              <a:ext uri="{28A0092B-C50C-407E-A947-70E740481C1C}">
+                <a14:useLocalDpi xmlns:a14="http://schemas.microsoft.com/office/drawing/2010/main" val="0"/>
+              </a:ext>
+            </a:extLst>
+          </a:blip>
+          <a:srcRect/>
+          <a:stretch>
+            <a:fillRect/>
+          </a:stretch>
+        </p:blipFill>
+        <p:spPr bwMode="auto">
+          <a:xfrm>
+            <a:off x="921942" y="2478381"/>
+            <a:ext cx="483314" cy="495102"/>
+          </a:xfrm>
+          <a:prstGeom prst="rect">
+            <a:avLst/>
+          </a:prstGeom>
+          <a:noFill/>
+          <a:ln>
+            <a:noFill/>
+          </a:ln>
+          <a:extLst>
+            <a:ext uri="{909E8E84-426E-40DD-AFC4-6F175D3DCCD1}">
+              <a14:hiddenFill xmlns:a14="http://schemas.microsoft.com/office/drawing/2010/main">
+                <a:solidFill>
+                  <a:schemeClr val="accent1"/>
+                </a:solidFill>
+              </a14:hiddenFill>
+            </a:ext>
+            <a:ext uri="{91240B29-F687-4F45-9708-019B960494DF}">
+              <a14:hiddenLine xmlns:a14="http://schemas.microsoft.com/office/drawing/2010/main" w="9525">
+                <a:solidFill>
+                  <a:schemeClr val="tx1"/>
+                </a:solidFill>
+                <a:miter lim="800000"/>
+                <a:headEnd/>
+                <a:tailEnd/>
+              </a14:hiddenLine>
+            </a:ext>
+          </a:extLst>
+        </p:spPr>
+      </p:pic>
+      <p:pic>
+        <p:nvPicPr>
+          <p:cNvPr id="1028" name="Picture 4"/>
+          <p:cNvPicPr>
+            <a:picLocks noChangeAspect="1" noChangeArrowheads="1"/>
+          </p:cNvPicPr>
+          <p:nvPr/>
+        </p:nvPicPr>
+        <p:blipFill>
+          <a:blip r:embed="rId5">
+            <a:extLst>
+              <a:ext uri="{28A0092B-C50C-407E-A947-70E740481C1C}">
+                <a14:useLocalDpi xmlns:a14="http://schemas.microsoft.com/office/drawing/2010/main" val="0"/>
+              </a:ext>
+            </a:extLst>
+          </a:blip>
+          <a:srcRect/>
+          <a:stretch>
+            <a:fillRect/>
+          </a:stretch>
+        </p:blipFill>
+        <p:spPr bwMode="auto">
+          <a:xfrm>
+            <a:off x="964831" y="2951938"/>
+            <a:ext cx="361950" cy="431800"/>
+          </a:xfrm>
+          <a:prstGeom prst="rect">
+            <a:avLst/>
+          </a:prstGeom>
+          <a:noFill/>
+          <a:ln>
+            <a:noFill/>
+          </a:ln>
+          <a:extLst>
+            <a:ext uri="{909E8E84-426E-40DD-AFC4-6F175D3DCCD1}">
+              <a14:hiddenFill xmlns:a14="http://schemas.microsoft.com/office/drawing/2010/main">
+                <a:solidFill>
+                  <a:schemeClr val="accent1"/>
+                </a:solidFill>
+              </a14:hiddenFill>
+            </a:ext>
+            <a:ext uri="{91240B29-F687-4F45-9708-019B960494DF}">
+              <a14:hiddenLine xmlns:a14="http://schemas.microsoft.com/office/drawing/2010/main" w="9525">
+                <a:solidFill>
+                  <a:schemeClr val="tx1"/>
+                </a:solidFill>
+                <a:miter lim="800000"/>
+                <a:headEnd/>
+                <a:tailEnd/>
+              </a14:hiddenLine>
+            </a:ext>
+          </a:extLst>
+        </p:spPr>
+      </p:pic>
+    </p:spTree>
+    <p:extLst>
+      <p:ext uri="{BB962C8B-B14F-4D97-AF65-F5344CB8AC3E}">
+        <p14:creationId xmlns:p14="http://schemas.microsoft.com/office/powerpoint/2010/main" val="449447107"/>
+      </p:ext>
+    </p:extLst>
+  </p:cSld>
+  <p:clrMapOvr>
+    <a:masterClrMapping/>
+  </p:clrMapOvr>
+  <p:timing>
+    <p:tnLst>
+      <p:par>
+        <p:cTn id="1" dur="indefinite" restart="never" nodeType="tmRoot"/>
+      </p:par>
+    </p:tnLst>
+  </p:timing>
+</p:sld>
+</file>
+
+<file path=ppt/slides/slide22.xml><?xml version="1.0" encoding="utf-8"?>
+<p:sld xmlns:a="http://schemas.openxmlformats.org/drawingml/2006/main" xmlns:r="http://schemas.openxmlformats.org/officeDocument/2006/relationships" xmlns:p="http://schemas.openxmlformats.org/presentationml/2006/main">
+  <p:cSld>
+    <p:spTree>
+      <p:nvGrpSpPr>
+        <p:cNvPr id="1" name=""/>
+        <p:cNvGrpSpPr/>
+        <p:nvPr/>
+      </p:nvGrpSpPr>
+      <p:grpSpPr>
+        <a:xfrm>
+          <a:off x="0" y="0"/>
+          <a:ext cx="0" cy="0"/>
+          <a:chOff x="0" y="0"/>
+          <a:chExt cx="0" cy="0"/>
+        </a:xfrm>
+      </p:grpSpPr>
+      <p:sp>
+        <p:nvSpPr>
+          <p:cNvPr id="2" name="Title 1"/>
+          <p:cNvSpPr>
+            <a:spLocks noGrp="1"/>
+          </p:cNvSpPr>
+          <p:nvPr>
+            <p:ph type="title"/>
+          </p:nvPr>
+        </p:nvSpPr>
+        <p:spPr/>
+        <p:txBody>
+          <a:bodyPr>
+            <a:normAutofit fontScale="90000"/>
+          </a:bodyPr>
+          <a:lstStyle/>
+          <a:p>
+            <a:r>
+              <a:rPr lang="en-GB" dirty="0" smtClean="0"/>
+              <a:t>Appendix 2: Other Source Control Systems</a:t>
+            </a:r>
+            <a:endParaRPr lang="en-US" dirty="0"/>
+          </a:p>
+        </p:txBody>
+      </p:sp>
+      <p:sp>
+        <p:nvSpPr>
+          <p:cNvPr id="3" name="Content Placeholder 2"/>
+          <p:cNvSpPr>
+            <a:spLocks noGrp="1"/>
+          </p:cNvSpPr>
+          <p:nvPr>
+            <p:ph idx="1"/>
+          </p:nvPr>
+        </p:nvSpPr>
+        <p:spPr>
+          <a:xfrm>
+            <a:off x="457200" y="1600201"/>
+            <a:ext cx="8229600" cy="3450802"/>
+          </a:xfrm>
+        </p:spPr>
+        <p:txBody>
+          <a:bodyPr>
+            <a:normAutofit/>
+          </a:bodyPr>
+          <a:lstStyle/>
+          <a:p>
+            <a:pPr>
+              <a:buFont typeface="Arial" charset="0"/>
+              <a:buChar char="•"/>
+            </a:pPr>
+            <a:r>
+              <a:rPr lang="en-US" sz="2400" dirty="0" smtClean="0">
+                <a:latin typeface="Arial"/>
+                <a:cs typeface="Arial"/>
+              </a:rPr>
+              <a:t>Subversion (SVN)</a:t>
+            </a:r>
+          </a:p>
+          <a:p>
+            <a:pPr>
+              <a:buFont typeface="Arial" charset="0"/>
+              <a:buChar char="•"/>
+            </a:pPr>
+            <a:r>
+              <a:rPr lang="en-US" sz="2400" dirty="0" err="1" smtClean="0">
+                <a:latin typeface="Arial"/>
+                <a:cs typeface="Arial"/>
+              </a:rPr>
+              <a:t>Git</a:t>
+            </a:r>
+            <a:endParaRPr lang="en-US" sz="2400" dirty="0" smtClean="0">
+              <a:latin typeface="Arial"/>
+              <a:cs typeface="Arial"/>
+            </a:endParaRPr>
+          </a:p>
+          <a:p>
+            <a:pPr>
+              <a:buFont typeface="Arial" charset="0"/>
+              <a:buChar char="•"/>
+            </a:pPr>
+            <a:r>
+              <a:rPr lang="en-US" sz="2400" dirty="0" smtClean="0">
+                <a:latin typeface="Arial"/>
+                <a:cs typeface="Arial"/>
+              </a:rPr>
+              <a:t>Team Foundation Server</a:t>
+            </a:r>
+          </a:p>
+          <a:p>
+            <a:pPr>
+              <a:buFont typeface="Arial" charset="0"/>
+              <a:buChar char="•"/>
+            </a:pPr>
+            <a:r>
+              <a:rPr lang="en-US" sz="2400" dirty="0" smtClean="0">
+                <a:latin typeface="Arial"/>
+                <a:cs typeface="Arial"/>
+              </a:rPr>
+              <a:t>Mercurial (Hg)</a:t>
+            </a:r>
+          </a:p>
+          <a:p>
+            <a:pPr>
+              <a:buFont typeface="Arial" charset="0"/>
+              <a:buChar char="•"/>
+            </a:pPr>
+            <a:r>
+              <a:rPr lang="en-US" sz="2400" dirty="0" err="1" smtClean="0">
+                <a:latin typeface="Arial"/>
+                <a:cs typeface="Arial"/>
+              </a:rPr>
+              <a:t>AccuRev</a:t>
+            </a:r>
+            <a:endParaRPr lang="en-US" sz="2400" dirty="0" smtClean="0">
+              <a:latin typeface="Arial"/>
+              <a:cs typeface="Arial"/>
+            </a:endParaRPr>
+          </a:p>
+          <a:p>
+            <a:pPr>
+              <a:buFont typeface="Arial" charset="0"/>
+              <a:buChar char="•"/>
+            </a:pPr>
+            <a:r>
+              <a:rPr lang="en-US" sz="2400" dirty="0" smtClean="0">
+                <a:latin typeface="Arial"/>
+                <a:cs typeface="Arial"/>
+              </a:rPr>
+              <a:t>Surround SCM</a:t>
+            </a:r>
+            <a:endParaRPr lang="en-US" sz="2400" dirty="0">
+              <a:latin typeface="Arial"/>
+              <a:cs typeface="Arial"/>
+            </a:endParaRPr>
+          </a:p>
+        </p:txBody>
+      </p:sp>
+      <p:sp>
+        <p:nvSpPr>
+          <p:cNvPr id="5" name="Subtitle 4"/>
+          <p:cNvSpPr txBox="1">
+            <a:spLocks/>
+          </p:cNvSpPr>
+          <p:nvPr/>
+        </p:nvSpPr>
+        <p:spPr>
+          <a:xfrm>
+            <a:off x="8028102" y="157880"/>
+            <a:ext cx="816516" cy="409189"/>
+          </a:xfrm>
+          <a:prstGeom prst="rect">
+            <a:avLst/>
+          </a:prstGeom>
+        </p:spPr>
+        <p:txBody>
+          <a:bodyPr vert="horz" lIns="91440" tIns="45720" rIns="91440" bIns="45720" rtlCol="0">
+            <a:normAutofit/>
+          </a:bodyPr>
+          <a:lstStyle>
+            <a:lvl1pPr marL="342900" indent="-342900" algn="l" defTabSz="457200" rtl="0" eaLnBrk="1" latinLnBrk="0" hangingPunct="1">
+              <a:spcBef>
+                <a:spcPct val="20000"/>
+              </a:spcBef>
+              <a:buFont typeface="Arial"/>
+              <a:buChar char="•"/>
+              <a:defRPr sz="2800" kern="1200">
+                <a:solidFill>
+                  <a:schemeClr val="tx1"/>
+                </a:solidFill>
+                <a:latin typeface="+mn-lt"/>
+                <a:ea typeface="+mn-ea"/>
+                <a:cs typeface="+mn-cs"/>
+              </a:defRPr>
+            </a:lvl1pPr>
+            <a:lvl2pPr marL="742950" indent="-285750" algn="l" defTabSz="457200" rtl="0" eaLnBrk="1" latinLnBrk="0" hangingPunct="1">
+              <a:spcBef>
+                <a:spcPct val="20000"/>
+              </a:spcBef>
+              <a:buFont typeface="Arial"/>
+              <a:buChar char="–"/>
+              <a:defRPr sz="2800" kern="1200">
+                <a:solidFill>
+                  <a:schemeClr val="tx1"/>
+                </a:solidFill>
+                <a:latin typeface="+mn-lt"/>
+                <a:ea typeface="+mn-ea"/>
+                <a:cs typeface="+mn-cs"/>
+              </a:defRPr>
+            </a:lvl2pPr>
+            <a:lvl3pPr marL="1143000" indent="-228600" algn="l" defTabSz="457200" rtl="0" eaLnBrk="1" latinLnBrk="0" hangingPunct="1">
+              <a:spcBef>
+                <a:spcPct val="20000"/>
+              </a:spcBef>
+              <a:buFont typeface="Arial"/>
+              <a:buChar char="•"/>
+              <a:defRPr sz="2400" kern="1200">
+                <a:solidFill>
+                  <a:schemeClr val="tx1"/>
+                </a:solidFill>
+                <a:latin typeface="+mn-lt"/>
+                <a:ea typeface="+mn-ea"/>
+                <a:cs typeface="+mn-cs"/>
+              </a:defRPr>
+            </a:lvl3pPr>
+            <a:lvl4pPr marL="1600200" indent="-228600" algn="l" defTabSz="457200" rtl="0" eaLnBrk="1" latinLnBrk="0" hangingPunct="1">
+              <a:spcBef>
+                <a:spcPct val="20000"/>
+              </a:spcBef>
+              <a:buFont typeface="Arial"/>
+              <a:buChar char="–"/>
+              <a:defRPr sz="2000" kern="1200">
+                <a:solidFill>
+                  <a:schemeClr val="tx1"/>
+                </a:solidFill>
+                <a:latin typeface="+mn-lt"/>
+                <a:ea typeface="+mn-ea"/>
+                <a:cs typeface="+mn-cs"/>
+              </a:defRPr>
+            </a:lvl4pPr>
+            <a:lvl5pPr marL="2057400" indent="-228600" algn="l" defTabSz="457200" rtl="0" eaLnBrk="1" latinLnBrk="0" hangingPunct="1">
+              <a:spcBef>
+                <a:spcPct val="20000"/>
+              </a:spcBef>
+              <a:buFont typeface="Arial"/>
+              <a:buChar char="»"/>
+              <a:defRPr sz="2000" kern="1200">
+                <a:solidFill>
+                  <a:schemeClr val="tx1"/>
+                </a:solidFill>
+                <a:latin typeface="+mn-lt"/>
+                <a:ea typeface="+mn-ea"/>
+                <a:cs typeface="+mn-cs"/>
+              </a:defRPr>
+            </a:lvl5pPr>
+            <a:lvl6pPr marL="2514600" indent="-228600" algn="l" defTabSz="457200" rtl="0" eaLnBrk="1" latinLnBrk="0" hangingPunct="1">
+              <a:spcBef>
+                <a:spcPct val="20000"/>
+              </a:spcBef>
+              <a:buFont typeface="Arial"/>
+              <a:buChar char="•"/>
+              <a:defRPr sz="2000" kern="1200">
+                <a:solidFill>
+                  <a:schemeClr val="tx1"/>
+                </a:solidFill>
+                <a:latin typeface="+mn-lt"/>
+                <a:ea typeface="+mn-ea"/>
+                <a:cs typeface="+mn-cs"/>
+              </a:defRPr>
+            </a:lvl6pPr>
+            <a:lvl7pPr marL="2971800" indent="-228600" algn="l" defTabSz="457200" rtl="0" eaLnBrk="1" latinLnBrk="0" hangingPunct="1">
+              <a:spcBef>
+                <a:spcPct val="20000"/>
+              </a:spcBef>
+              <a:buFont typeface="Arial"/>
+              <a:buChar char="•"/>
+              <a:defRPr sz="2000" kern="1200">
+                <a:solidFill>
+                  <a:schemeClr val="tx1"/>
+                </a:solidFill>
+                <a:latin typeface="+mn-lt"/>
+                <a:ea typeface="+mn-ea"/>
+                <a:cs typeface="+mn-cs"/>
+              </a:defRPr>
+            </a:lvl7pPr>
+            <a:lvl8pPr marL="3429000" indent="-228600" algn="l" defTabSz="457200" rtl="0" eaLnBrk="1" latinLnBrk="0" hangingPunct="1">
+              <a:spcBef>
+                <a:spcPct val="20000"/>
+              </a:spcBef>
+              <a:buFont typeface="Arial"/>
+              <a:buChar char="•"/>
+              <a:defRPr sz="2000" kern="1200">
+                <a:solidFill>
+                  <a:schemeClr val="tx1"/>
+                </a:solidFill>
+                <a:latin typeface="+mn-lt"/>
+                <a:ea typeface="+mn-ea"/>
+                <a:cs typeface="+mn-cs"/>
+              </a:defRPr>
+            </a:lvl8pPr>
+            <a:lvl9pPr marL="3886200" indent="-228600" algn="l" defTabSz="457200" rtl="0" eaLnBrk="1" latinLnBrk="0" hangingPunct="1">
+              <a:spcBef>
+                <a:spcPct val="20000"/>
+              </a:spcBef>
+              <a:buFont typeface="Arial"/>
+              <a:buChar char="•"/>
+              <a:defRPr sz="2000" kern="1200">
+                <a:solidFill>
+                  <a:schemeClr val="tx1"/>
+                </a:solidFill>
+                <a:latin typeface="+mn-lt"/>
+                <a:ea typeface="+mn-ea"/>
+                <a:cs typeface="+mn-cs"/>
+              </a:defRPr>
+            </a:lvl9pPr>
+          </a:lstStyle>
+          <a:p>
+            <a:pPr marL="0" indent="0">
+              <a:buNone/>
+            </a:pPr>
+            <a:r>
+              <a:rPr lang="en-US" sz="1600" dirty="0">
+                <a:solidFill>
+                  <a:schemeClr val="tx1">
+                    <a:lumMod val="75000"/>
+                    <a:lumOff val="25000"/>
+                  </a:schemeClr>
+                </a:solidFill>
+              </a:rPr>
+              <a:t>#sqlcity</a:t>
+            </a:r>
+            <a:endParaRPr lang="en-US" sz="1600" dirty="0">
+              <a:solidFill>
+                <a:schemeClr val="tx1">
+                  <a:lumMod val="75000"/>
+                  <a:lumOff val="25000"/>
+                </a:schemeClr>
+              </a:solidFill>
+              <a:latin typeface="Arial"/>
+              <a:cs typeface="Arial"/>
+            </a:endParaRPr>
+          </a:p>
+        </p:txBody>
+      </p:sp>
+    </p:spTree>
+    <p:extLst>
+      <p:ext uri="{BB962C8B-B14F-4D97-AF65-F5344CB8AC3E}">
+        <p14:creationId xmlns:p14="http://schemas.microsoft.com/office/powerpoint/2010/main" val="2082039250"/>
+      </p:ext>
+    </p:extLst>
+  </p:cSld>
+  <p:clrMapOvr>
+    <a:masterClrMapping/>
+  </p:clrMapOvr>
+  <p:timing>
+    <p:tnLst>
+      <p:par>
+        <p:cTn id="1" dur="indefinite" restart="never" nodeType="tmRoot"/>
+      </p:par>
+    </p:tnLst>
+  </p:timing>
+</p:sld>
+</file>
+
+<file path=ppt/slides/slide23.xml><?xml version="1.0" encoding="utf-8"?>
+<p:sld xmlns:a="http://schemas.openxmlformats.org/drawingml/2006/main" xmlns:r="http://schemas.openxmlformats.org/officeDocument/2006/relationships" xmlns:p="http://schemas.openxmlformats.org/presentationml/2006/main">
+  <p:cSld>
+    <p:spTree>
+      <p:nvGrpSpPr>
+        <p:cNvPr id="1" name=""/>
+        <p:cNvGrpSpPr/>
+        <p:nvPr/>
+      </p:nvGrpSpPr>
+      <p:grpSpPr>
+        <a:xfrm>
+          <a:off x="0" y="0"/>
+          <a:ext cx="0" cy="0"/>
+          <a:chOff x="0" y="0"/>
+          <a:chExt cx="0" cy="0"/>
+        </a:xfrm>
+      </p:grpSpPr>
+      <p:sp>
+        <p:nvSpPr>
+          <p:cNvPr id="2" name="Title 1"/>
+          <p:cNvSpPr>
+            <a:spLocks noGrp="1"/>
+          </p:cNvSpPr>
+          <p:nvPr>
+            <p:ph type="title"/>
+          </p:nvPr>
+        </p:nvSpPr>
+        <p:spPr/>
+        <p:txBody>
+          <a:bodyPr/>
+          <a:lstStyle/>
+          <a:p>
+            <a:r>
               <a:rPr lang="en-US" dirty="0" smtClean="0"/>
               <a:t>Links / Contact Info</a:t>
             </a:r>
@@ -11390,9 +12302,241 @@
           <a:chExt cx="0" cy="0"/>
         </a:xfrm>
       </p:grpSpPr>
+      <p:sp>
+        <p:nvSpPr>
+          <p:cNvPr id="2" name="Title 1"/>
+          <p:cNvSpPr>
+            <a:spLocks noGrp="1"/>
+          </p:cNvSpPr>
+          <p:nvPr>
+            <p:ph type="title"/>
+          </p:nvPr>
+        </p:nvSpPr>
+        <p:spPr/>
+        <p:txBody>
+          <a:bodyPr/>
+          <a:lstStyle/>
+          <a:p>
+            <a:r>
+              <a:rPr lang="en-GB" dirty="0" smtClean="0"/>
+              <a:t>Why am I here?</a:t>
+            </a:r>
+            <a:endParaRPr lang="en-GB" dirty="0"/>
+          </a:p>
+        </p:txBody>
+      </p:sp>
+      <p:sp>
+        <p:nvSpPr>
+          <p:cNvPr id="3" name="Content Placeholder 2"/>
+          <p:cNvSpPr>
+            <a:spLocks noGrp="1"/>
+          </p:cNvSpPr>
+          <p:nvPr>
+            <p:ph idx="1"/>
+          </p:nvPr>
+        </p:nvSpPr>
+        <p:spPr/>
+        <p:txBody>
+          <a:bodyPr/>
+          <a:lstStyle/>
+          <a:p>
+            <a:r>
+              <a:rPr lang="en-GB" dirty="0" smtClean="0"/>
+              <a:t>To show how easy it is to apply CI principals to Database Development</a:t>
+            </a:r>
+            <a:endParaRPr lang="en-GB" dirty="0"/>
+          </a:p>
+        </p:txBody>
+      </p:sp>
+      <p:sp>
+        <p:nvSpPr>
+          <p:cNvPr id="4" name="Subtitle 4"/>
+          <p:cNvSpPr txBox="1">
+            <a:spLocks/>
+          </p:cNvSpPr>
+          <p:nvPr/>
+        </p:nvSpPr>
+        <p:spPr>
+          <a:xfrm>
+            <a:off x="8028102" y="157880"/>
+            <a:ext cx="816516" cy="409189"/>
+          </a:xfrm>
+          <a:prstGeom prst="rect">
+            <a:avLst/>
+          </a:prstGeom>
+        </p:spPr>
+        <p:txBody>
+          <a:bodyPr vert="horz" lIns="91440" tIns="45720" rIns="91440" bIns="45720" rtlCol="0">
+            <a:normAutofit/>
+          </a:bodyPr>
+          <a:lstStyle>
+            <a:lvl1pPr marL="342900" indent="-342900" algn="l" defTabSz="457200" rtl="0" eaLnBrk="1" latinLnBrk="0" hangingPunct="1">
+              <a:spcBef>
+                <a:spcPct val="20000"/>
+              </a:spcBef>
+              <a:buFont typeface="Arial"/>
+              <a:buChar char="•"/>
+              <a:defRPr sz="2800" kern="1200">
+                <a:solidFill>
+                  <a:schemeClr val="tx1"/>
+                </a:solidFill>
+                <a:latin typeface="+mn-lt"/>
+                <a:ea typeface="+mn-ea"/>
+                <a:cs typeface="+mn-cs"/>
+              </a:defRPr>
+            </a:lvl1pPr>
+            <a:lvl2pPr marL="742950" indent="-285750" algn="l" defTabSz="457200" rtl="0" eaLnBrk="1" latinLnBrk="0" hangingPunct="1">
+              <a:spcBef>
+                <a:spcPct val="20000"/>
+              </a:spcBef>
+              <a:buFont typeface="Arial"/>
+              <a:buChar char="–"/>
+              <a:defRPr sz="2800" kern="1200">
+                <a:solidFill>
+                  <a:schemeClr val="tx1"/>
+                </a:solidFill>
+                <a:latin typeface="+mn-lt"/>
+                <a:ea typeface="+mn-ea"/>
+                <a:cs typeface="+mn-cs"/>
+              </a:defRPr>
+            </a:lvl2pPr>
+            <a:lvl3pPr marL="1143000" indent="-228600" algn="l" defTabSz="457200" rtl="0" eaLnBrk="1" latinLnBrk="0" hangingPunct="1">
+              <a:spcBef>
+                <a:spcPct val="20000"/>
+              </a:spcBef>
+              <a:buFont typeface="Arial"/>
+              <a:buChar char="•"/>
+              <a:defRPr sz="2400" kern="1200">
+                <a:solidFill>
+                  <a:schemeClr val="tx1"/>
+                </a:solidFill>
+                <a:latin typeface="+mn-lt"/>
+                <a:ea typeface="+mn-ea"/>
+                <a:cs typeface="+mn-cs"/>
+              </a:defRPr>
+            </a:lvl3pPr>
+            <a:lvl4pPr marL="1600200" indent="-228600" algn="l" defTabSz="457200" rtl="0" eaLnBrk="1" latinLnBrk="0" hangingPunct="1">
+              <a:spcBef>
+                <a:spcPct val="20000"/>
+              </a:spcBef>
+              <a:buFont typeface="Arial"/>
+              <a:buChar char="–"/>
+              <a:defRPr sz="2000" kern="1200">
+                <a:solidFill>
+                  <a:schemeClr val="tx1"/>
+                </a:solidFill>
+                <a:latin typeface="+mn-lt"/>
+                <a:ea typeface="+mn-ea"/>
+                <a:cs typeface="+mn-cs"/>
+              </a:defRPr>
+            </a:lvl4pPr>
+            <a:lvl5pPr marL="2057400" indent="-228600" algn="l" defTabSz="457200" rtl="0" eaLnBrk="1" latinLnBrk="0" hangingPunct="1">
+              <a:spcBef>
+                <a:spcPct val="20000"/>
+              </a:spcBef>
+              <a:buFont typeface="Arial"/>
+              <a:buChar char="»"/>
+              <a:defRPr sz="2000" kern="1200">
+                <a:solidFill>
+                  <a:schemeClr val="tx1"/>
+                </a:solidFill>
+                <a:latin typeface="+mn-lt"/>
+                <a:ea typeface="+mn-ea"/>
+                <a:cs typeface="+mn-cs"/>
+              </a:defRPr>
+            </a:lvl5pPr>
+            <a:lvl6pPr marL="2514600" indent="-228600" algn="l" defTabSz="457200" rtl="0" eaLnBrk="1" latinLnBrk="0" hangingPunct="1">
+              <a:spcBef>
+                <a:spcPct val="20000"/>
+              </a:spcBef>
+              <a:buFont typeface="Arial"/>
+              <a:buChar char="•"/>
+              <a:defRPr sz="2000" kern="1200">
+                <a:solidFill>
+                  <a:schemeClr val="tx1"/>
+                </a:solidFill>
+                <a:latin typeface="+mn-lt"/>
+                <a:ea typeface="+mn-ea"/>
+                <a:cs typeface="+mn-cs"/>
+              </a:defRPr>
+            </a:lvl6pPr>
+            <a:lvl7pPr marL="2971800" indent="-228600" algn="l" defTabSz="457200" rtl="0" eaLnBrk="1" latinLnBrk="0" hangingPunct="1">
+              <a:spcBef>
+                <a:spcPct val="20000"/>
+              </a:spcBef>
+              <a:buFont typeface="Arial"/>
+              <a:buChar char="•"/>
+              <a:defRPr sz="2000" kern="1200">
+                <a:solidFill>
+                  <a:schemeClr val="tx1"/>
+                </a:solidFill>
+                <a:latin typeface="+mn-lt"/>
+                <a:ea typeface="+mn-ea"/>
+                <a:cs typeface="+mn-cs"/>
+              </a:defRPr>
+            </a:lvl7pPr>
+            <a:lvl8pPr marL="3429000" indent="-228600" algn="l" defTabSz="457200" rtl="0" eaLnBrk="1" latinLnBrk="0" hangingPunct="1">
+              <a:spcBef>
+                <a:spcPct val="20000"/>
+              </a:spcBef>
+              <a:buFont typeface="Arial"/>
+              <a:buChar char="•"/>
+              <a:defRPr sz="2000" kern="1200">
+                <a:solidFill>
+                  <a:schemeClr val="tx1"/>
+                </a:solidFill>
+                <a:latin typeface="+mn-lt"/>
+                <a:ea typeface="+mn-ea"/>
+                <a:cs typeface="+mn-cs"/>
+              </a:defRPr>
+            </a:lvl8pPr>
+            <a:lvl9pPr marL="3886200" indent="-228600" algn="l" defTabSz="457200" rtl="0" eaLnBrk="1" latinLnBrk="0" hangingPunct="1">
+              <a:spcBef>
+                <a:spcPct val="20000"/>
+              </a:spcBef>
+              <a:buFont typeface="Arial"/>
+              <a:buChar char="•"/>
+              <a:defRPr sz="2000" kern="1200">
+                <a:solidFill>
+                  <a:schemeClr val="tx1"/>
+                </a:solidFill>
+                <a:latin typeface="+mn-lt"/>
+                <a:ea typeface="+mn-ea"/>
+                <a:cs typeface="+mn-cs"/>
+              </a:defRPr>
+            </a:lvl9pPr>
+          </a:lstStyle>
+          <a:p>
+            <a:pPr marL="0" indent="0">
+              <a:buNone/>
+            </a:pPr>
+            <a:r>
+              <a:rPr lang="en-US" sz="1600" dirty="0">
+                <a:solidFill>
+                  <a:schemeClr val="tx1">
+                    <a:lumMod val="75000"/>
+                    <a:lumOff val="25000"/>
+                  </a:schemeClr>
+                </a:solidFill>
+              </a:rPr>
+              <a:t>#sqlcity</a:t>
+            </a:r>
+            <a:endParaRPr lang="en-US" sz="1600" dirty="0">
+              <a:solidFill>
+                <a:schemeClr val="tx1">
+                  <a:lumMod val="75000"/>
+                  <a:lumOff val="25000"/>
+                </a:schemeClr>
+              </a:solidFill>
+              <a:latin typeface="Arial"/>
+              <a:cs typeface="Arial"/>
+            </a:endParaRPr>
+          </a:p>
+        </p:txBody>
+      </p:sp>
       <p:pic>
         <p:nvPicPr>
-          <p:cNvPr id="2050" name="Picture 2"/>
+          <p:cNvPr id="5" name="Picture 2" descr="http://1.bp.blogspot.com/-zs3wsTioXsM/TdQfndux5II/AAAAAAAAAtQ/XkPLnBpbHXY/s400/Mary_Tyler_Moore_throwing_hat_in_air.jpg"/>
           <p:cNvPicPr>
             <a:picLocks noChangeAspect="1" noChangeArrowheads="1"/>
           </p:cNvPicPr>
@@ -11413,294 +12557,44 @@
         </p:blipFill>
         <p:spPr bwMode="auto">
           <a:xfrm>
-            <a:off x="2110259" y="2666215"/>
-            <a:ext cx="4512179" cy="2632104"/>
+            <a:off x="5225118" y="2585225"/>
+            <a:ext cx="3619500" cy="2705100"/>
           </a:xfrm>
           <a:prstGeom prst="rect">
             <a:avLst/>
           </a:prstGeom>
-          <a:noFill/>
-          <a:ln>
-            <a:noFill/>
+          <a:solidFill>
+            <a:srgbClr val="FFFFFF">
+              <a:shade val="85000"/>
+            </a:srgbClr>
+          </a:solidFill>
+          <a:ln w="190500" cap="rnd">
+            <a:solidFill>
+              <a:srgbClr val="FFFFFF"/>
+            </a:solidFill>
           </a:ln>
           <a:effectLst>
-            <a:outerShdw blurRad="406400" dist="114300" dir="2700000" algn="tl" rotWithShape="0">
-              <a:prstClr val="black">
-                <a:alpha val="40000"/>
-              </a:prstClr>
+            <a:outerShdw blurRad="50000" algn="tl" rotWithShape="0">
+              <a:srgbClr val="000000">
+                <a:alpha val="41000"/>
+              </a:srgbClr>
             </a:outerShdw>
           </a:effectLst>
-          <a:extLst>
-            <a:ext uri="{909E8E84-426E-40DD-AFC4-6F175D3DCCD1}">
-              <a14:hiddenFill xmlns:a14="http://schemas.microsoft.com/office/drawing/2010/main">
-                <a:solidFill>
-                  <a:schemeClr val="accent1"/>
-                </a:solidFill>
-              </a14:hiddenFill>
-            </a:ext>
-            <a:ext uri="{91240B29-F687-4F45-9708-019B960494DF}">
-              <a14:hiddenLine xmlns:a14="http://schemas.microsoft.com/office/drawing/2010/main" w="9525">
-                <a:solidFill>
-                  <a:schemeClr val="tx1"/>
-                </a:solidFill>
-                <a:miter lim="800000"/>
-                <a:headEnd/>
-                <a:tailEnd/>
-              </a14:hiddenLine>
-            </a:ext>
-          </a:extLst>
+          <a:scene3d>
+            <a:camera prst="orthographicFront"/>
+            <a:lightRig rig="twoPt" dir="t">
+              <a:rot lat="0" lon="0" rev="7800000"/>
+            </a:lightRig>
+          </a:scene3d>
+          <a:sp3d contourW="6350">
+            <a:bevelT w="50800" h="16510"/>
+            <a:contourClr>
+              <a:srgbClr val="C0C0C0"/>
+            </a:contourClr>
+          </a:sp3d>
+          <a:extLst/>
         </p:spPr>
       </p:pic>
-      <p:sp>
-        <p:nvSpPr>
-          <p:cNvPr id="2" name="Title 1"/>
-          <p:cNvSpPr>
-            <a:spLocks noGrp="1"/>
-          </p:cNvSpPr>
-          <p:nvPr>
-            <p:ph type="title"/>
-          </p:nvPr>
-        </p:nvSpPr>
-        <p:spPr/>
-        <p:txBody>
-          <a:bodyPr/>
-          <a:lstStyle/>
-          <a:p>
-            <a:r>
-              <a:rPr lang="en-GB" dirty="0" smtClean="0"/>
-              <a:t>Why am I here?</a:t>
-            </a:r>
-            <a:endParaRPr lang="en-GB" dirty="0"/>
-          </a:p>
-        </p:txBody>
-      </p:sp>
-      <p:sp>
-        <p:nvSpPr>
-          <p:cNvPr id="3" name="Content Placeholder 2"/>
-          <p:cNvSpPr>
-            <a:spLocks noGrp="1"/>
-          </p:cNvSpPr>
-          <p:nvPr>
-            <p:ph idx="1"/>
-          </p:nvPr>
-        </p:nvSpPr>
-        <p:spPr/>
-        <p:txBody>
-          <a:bodyPr/>
-          <a:lstStyle/>
-          <a:p>
-            <a:r>
-              <a:rPr lang="en-GB" dirty="0" smtClean="0"/>
-              <a:t>To sing the praises of </a:t>
-            </a:r>
-            <a:r>
-              <a:rPr lang="en-GB" b="1" dirty="0">
-                <a:solidFill>
-                  <a:srgbClr val="C00000"/>
-                </a:solidFill>
-              </a:rPr>
-              <a:t>R</a:t>
-            </a:r>
-            <a:r>
-              <a:rPr lang="en-GB" b="1" dirty="0" smtClean="0">
-                <a:solidFill>
-                  <a:srgbClr val="C00000"/>
-                </a:solidFill>
-              </a:rPr>
-              <a:t>ed Gate SQL Source Control</a:t>
-            </a:r>
-          </a:p>
-          <a:p>
-            <a:endParaRPr lang="en-GB" dirty="0"/>
-          </a:p>
-        </p:txBody>
-      </p:sp>
-      <p:sp>
-        <p:nvSpPr>
-          <p:cNvPr id="4" name="Subtitle 4"/>
-          <p:cNvSpPr txBox="1">
-            <a:spLocks/>
-          </p:cNvSpPr>
-          <p:nvPr/>
-        </p:nvSpPr>
-        <p:spPr>
-          <a:xfrm>
-            <a:off x="8028102" y="157880"/>
-            <a:ext cx="816516" cy="409189"/>
-          </a:xfrm>
-          <a:prstGeom prst="rect">
-            <a:avLst/>
-          </a:prstGeom>
-        </p:spPr>
-        <p:txBody>
-          <a:bodyPr vert="horz" lIns="91440" tIns="45720" rIns="91440" bIns="45720" rtlCol="0">
-            <a:normAutofit/>
-          </a:bodyPr>
-          <a:lstStyle>
-            <a:lvl1pPr marL="342900" indent="-342900" algn="l" defTabSz="457200" rtl="0" eaLnBrk="1" latinLnBrk="0" hangingPunct="1">
-              <a:spcBef>
-                <a:spcPct val="20000"/>
-              </a:spcBef>
-              <a:buFont typeface="Arial"/>
-              <a:buChar char="•"/>
-              <a:defRPr sz="2800" kern="1200">
-                <a:solidFill>
-                  <a:schemeClr val="tx1"/>
-                </a:solidFill>
-                <a:latin typeface="+mn-lt"/>
-                <a:ea typeface="+mn-ea"/>
-                <a:cs typeface="+mn-cs"/>
-              </a:defRPr>
-            </a:lvl1pPr>
-            <a:lvl2pPr marL="742950" indent="-285750" algn="l" defTabSz="457200" rtl="0" eaLnBrk="1" latinLnBrk="0" hangingPunct="1">
-              <a:spcBef>
-                <a:spcPct val="20000"/>
-              </a:spcBef>
-              <a:buFont typeface="Arial"/>
-              <a:buChar char="–"/>
-              <a:defRPr sz="2800" kern="1200">
-                <a:solidFill>
-                  <a:schemeClr val="tx1"/>
-                </a:solidFill>
-                <a:latin typeface="+mn-lt"/>
-                <a:ea typeface="+mn-ea"/>
-                <a:cs typeface="+mn-cs"/>
-              </a:defRPr>
-            </a:lvl2pPr>
-            <a:lvl3pPr marL="1143000" indent="-228600" algn="l" defTabSz="457200" rtl="0" eaLnBrk="1" latinLnBrk="0" hangingPunct="1">
-              <a:spcBef>
-                <a:spcPct val="20000"/>
-              </a:spcBef>
-              <a:buFont typeface="Arial"/>
-              <a:buChar char="•"/>
-              <a:defRPr sz="2400" kern="1200">
-                <a:solidFill>
-                  <a:schemeClr val="tx1"/>
-                </a:solidFill>
-                <a:latin typeface="+mn-lt"/>
-                <a:ea typeface="+mn-ea"/>
-                <a:cs typeface="+mn-cs"/>
-              </a:defRPr>
-            </a:lvl3pPr>
-            <a:lvl4pPr marL="1600200" indent="-228600" algn="l" defTabSz="457200" rtl="0" eaLnBrk="1" latinLnBrk="0" hangingPunct="1">
-              <a:spcBef>
-                <a:spcPct val="20000"/>
-              </a:spcBef>
-              <a:buFont typeface="Arial"/>
-              <a:buChar char="–"/>
-              <a:defRPr sz="2000" kern="1200">
-                <a:solidFill>
-                  <a:schemeClr val="tx1"/>
-                </a:solidFill>
-                <a:latin typeface="+mn-lt"/>
-                <a:ea typeface="+mn-ea"/>
-                <a:cs typeface="+mn-cs"/>
-              </a:defRPr>
-            </a:lvl4pPr>
-            <a:lvl5pPr marL="2057400" indent="-228600" algn="l" defTabSz="457200" rtl="0" eaLnBrk="1" latinLnBrk="0" hangingPunct="1">
-              <a:spcBef>
-                <a:spcPct val="20000"/>
-              </a:spcBef>
-              <a:buFont typeface="Arial"/>
-              <a:buChar char="»"/>
-              <a:defRPr sz="2000" kern="1200">
-                <a:solidFill>
-                  <a:schemeClr val="tx1"/>
-                </a:solidFill>
-                <a:latin typeface="+mn-lt"/>
-                <a:ea typeface="+mn-ea"/>
-                <a:cs typeface="+mn-cs"/>
-              </a:defRPr>
-            </a:lvl5pPr>
-            <a:lvl6pPr marL="2514600" indent="-228600" algn="l" defTabSz="457200" rtl="0" eaLnBrk="1" latinLnBrk="0" hangingPunct="1">
-              <a:spcBef>
-                <a:spcPct val="20000"/>
-              </a:spcBef>
-              <a:buFont typeface="Arial"/>
-              <a:buChar char="•"/>
-              <a:defRPr sz="2000" kern="1200">
-                <a:solidFill>
-                  <a:schemeClr val="tx1"/>
-                </a:solidFill>
-                <a:latin typeface="+mn-lt"/>
-                <a:ea typeface="+mn-ea"/>
-                <a:cs typeface="+mn-cs"/>
-              </a:defRPr>
-            </a:lvl6pPr>
-            <a:lvl7pPr marL="2971800" indent="-228600" algn="l" defTabSz="457200" rtl="0" eaLnBrk="1" latinLnBrk="0" hangingPunct="1">
-              <a:spcBef>
-                <a:spcPct val="20000"/>
-              </a:spcBef>
-              <a:buFont typeface="Arial"/>
-              <a:buChar char="•"/>
-              <a:defRPr sz="2000" kern="1200">
-                <a:solidFill>
-                  <a:schemeClr val="tx1"/>
-                </a:solidFill>
-                <a:latin typeface="+mn-lt"/>
-                <a:ea typeface="+mn-ea"/>
-                <a:cs typeface="+mn-cs"/>
-              </a:defRPr>
-            </a:lvl7pPr>
-            <a:lvl8pPr marL="3429000" indent="-228600" algn="l" defTabSz="457200" rtl="0" eaLnBrk="1" latinLnBrk="0" hangingPunct="1">
-              <a:spcBef>
-                <a:spcPct val="20000"/>
-              </a:spcBef>
-              <a:buFont typeface="Arial"/>
-              <a:buChar char="•"/>
-              <a:defRPr sz="2000" kern="1200">
-                <a:solidFill>
-                  <a:schemeClr val="tx1"/>
-                </a:solidFill>
-                <a:latin typeface="+mn-lt"/>
-                <a:ea typeface="+mn-ea"/>
-                <a:cs typeface="+mn-cs"/>
-              </a:defRPr>
-            </a:lvl8pPr>
-            <a:lvl9pPr marL="3886200" indent="-228600" algn="l" defTabSz="457200" rtl="0" eaLnBrk="1" latinLnBrk="0" hangingPunct="1">
-              <a:spcBef>
-                <a:spcPct val="20000"/>
-              </a:spcBef>
-              <a:buFont typeface="Arial"/>
-              <a:buChar char="•"/>
-              <a:defRPr sz="2000" kern="1200">
-                <a:solidFill>
-                  <a:schemeClr val="tx1"/>
-                </a:solidFill>
-                <a:latin typeface="+mn-lt"/>
-                <a:ea typeface="+mn-ea"/>
-                <a:cs typeface="+mn-cs"/>
-              </a:defRPr>
-            </a:lvl9pPr>
-          </a:lstStyle>
-          <a:p>
-            <a:pPr marL="0" indent="0">
-              <a:buNone/>
-            </a:pPr>
-            <a:r>
-              <a:rPr lang="en-US" sz="1600" dirty="0">
-                <a:solidFill>
-                  <a:schemeClr val="tx1">
-                    <a:lumMod val="75000"/>
-                    <a:lumOff val="25000"/>
-                  </a:schemeClr>
-                </a:solidFill>
-              </a:rPr>
-              <a:t>#sqlcity</a:t>
-            </a:r>
-            <a:endParaRPr lang="en-US" sz="1600" dirty="0">
-              <a:solidFill>
-                <a:schemeClr val="tx1">
-                  <a:lumMod val="75000"/>
-                  <a:lumOff val="25000"/>
-                </a:schemeClr>
-              </a:solidFill>
-              <a:latin typeface="Arial"/>
-              <a:cs typeface="Arial"/>
-            </a:endParaRPr>
-          </a:p>
-        </p:txBody>
-      </p:sp>
     </p:spTree>
     <p:extLst>
       <p:ext uri="{BB962C8B-B14F-4D97-AF65-F5344CB8AC3E}">
@@ -11881,26 +12775,7 @@
               <a:rPr lang="en-GB" sz="2400" dirty="0" smtClean="0"/>
               <a:t>to run unit tests</a:t>
             </a:r>
-            <a:br>
-              <a:rPr lang="en-GB" sz="2400" dirty="0" smtClean="0"/>
-            </a:br>
-            <a:r>
-              <a:rPr lang="en-GB" sz="2400" i="1" dirty="0" smtClean="0">
-                <a:solidFill>
-                  <a:schemeClr val="bg1">
-                    <a:lumMod val="65000"/>
-                  </a:schemeClr>
-                </a:solidFill>
-              </a:rPr>
-              <a:t>(time permitting)</a:t>
-            </a:r>
-            <a:endParaRPr lang="en-GB" sz="2400" i="1" dirty="0">
-              <a:solidFill>
-                <a:schemeClr val="bg1">
-                  <a:lumMod val="65000"/>
-                </a:schemeClr>
-              </a:solidFill>
-            </a:endParaRPr>
+            <a:endParaRPr lang="en-GB" sz="2400" dirty="0"/>
           </a:p>
         </p:txBody>
       </p:sp>
@@ -12499,7 +13374,9 @@
         </p:nvSpPr>
         <p:spPr/>
         <p:txBody>
-          <a:bodyPr/>
+          <a:bodyPr>
+            <a:normAutofit lnSpcReduction="10000"/>
+          </a:bodyPr>
           <a:lstStyle/>
           <a:p>
             <a:r>
@@ -12510,12 +13387,23 @@
               <a:t>      SQL </a:t>
             </a:r>
             <a:r>
-              <a:rPr lang="en-US" sz="2400" dirty="0">
+              <a:rPr lang="en-US" sz="2400">
                 <a:latin typeface="Arial"/>
                 <a:cs typeface="Arial"/>
               </a:rPr>
-              <a:t>Server 2008</a:t>
-            </a:r>
+              <a:t>Server </a:t>
+            </a:r>
+            <a:r>
+              <a:rPr lang="en-US" sz="2400" smtClean="0">
+                <a:latin typeface="Arial"/>
+                <a:cs typeface="Arial"/>
+              </a:rPr>
+              <a:t>2008 / 2012</a:t>
+            </a:r>
+            <a:endParaRPr lang="en-US" sz="2400" dirty="0">
+              <a:latin typeface="Arial"/>
+              <a:cs typeface="Arial"/>
+            </a:endParaRPr>
           </a:p>
           <a:p>
             <a:r>
@@ -12653,8 +13541,29 @@
                 <a:latin typeface="Arial"/>
                 <a:cs typeface="Arial"/>
               </a:rPr>
-              <a:t>Promoted Build Plugin</a:t>
-            </a:r>
+              <a:t>Promoted Build </a:t>
+            </a:r>
+            <a:r>
+              <a:rPr lang="en-US" sz="2400" dirty="0" smtClean="0">
+                <a:latin typeface="Arial"/>
+                <a:cs typeface="Arial"/>
+              </a:rPr>
+              <a:t>Plugin</a:t>
+            </a:r>
+          </a:p>
+          <a:p>
+            <a:pPr lvl="1"/>
+            <a:r>
+              <a:rPr lang="en-US" sz="2400" dirty="0" smtClean="0">
+                <a:latin typeface="Arial"/>
+                <a:cs typeface="Arial"/>
+              </a:rPr>
+              <a:t>Copy Artifacts Plugin</a:t>
+            </a:r>
+            <a:endParaRPr lang="en-US" sz="2400" dirty="0">
+              <a:latin typeface="Arial"/>
+              <a:cs typeface="Arial"/>
+            </a:endParaRPr>
           </a:p>
           <a:p>
             <a:pPr lvl="1"/>
@@ -14519,8 +15428,8 @@
         </p:nvSpPr>
         <p:spPr>
           <a:xfrm>
-            <a:off x="5167467" y="3429047"/>
-            <a:ext cx="3581238" cy="400110"/>
+            <a:off x="5464826" y="3100948"/>
+            <a:ext cx="2986523" cy="707886"/>
           </a:xfrm>
           <a:prstGeom prst="rect">
             <a:avLst/>
@@ -14536,7 +15445,14 @@
             <a:pPr algn="ctr"/>
             <a:r>
               <a:rPr lang="en-US" sz="2000" b="1" dirty="0" smtClean="0"/>
-              <a:t>Build and Database Server (VM)</a:t>
+              <a:t>Build and Database Server</a:t>
+            </a:r>
+            <a:br>
+              <a:rPr lang="en-US" sz="2000" b="1" dirty="0" smtClean="0"/>
+            </a:br>
+            <a:r>
+              <a:rPr lang="en-US" sz="2000" b="1" dirty="0" smtClean="0"/>
+              <a:t>(Windows Azure VM)</a:t>
             </a:r>
             <a:endParaRPr lang="en-US" sz="2000" b="1" dirty="0"/>
           </a:p>

</xml_diff>

<commit_message>
Updated link to the GitHub repository
</commit_message>
<xml_diff>
--- a/SQL in the City 2012 - Ernest Hwang.pptx
+++ b/SQL in the City 2012 - Ernest Hwang.pptx
@@ -11932,7 +11932,9 @@
           </a:xfrm>
         </p:spPr>
         <p:txBody>
-          <a:bodyPr/>
+          <a:bodyPr>
+            <a:normAutofit/>
+          </a:bodyPr>
           <a:lstStyle/>
           <a:p>
             <a:r>
@@ -11961,11 +11963,19 @@
           <a:p>
             <a:r>
               <a:rPr lang="en-US" dirty="0" smtClean="0"/>
-              <a:t>       CF9/</a:t>
-            </a:r>
-            <a:r>
-              <a:rPr lang="en-US" dirty="0" err="1" smtClean="0"/>
-              <a:t>Databases.RGDemo</a:t>
+              <a:t>       </a:t>
+            </a:r>
+            <a:r>
+              <a:rPr lang="en-US" dirty="0">
+                <a:hlinkClick r:id="rId4"/>
+              </a:rPr>
+              <a:t>https://</a:t>
+            </a:r>
+            <a:r>
+              <a:rPr lang="en-US" dirty="0" smtClean="0">
+                <a:hlinkClick r:id="rId4"/>
+              </a:rPr>
+              <a:t>github.com/CF9/Databases.RGDemo</a:t>
             </a:r>
             <a:endParaRPr lang="en-US" dirty="0" smtClean="0"/>
           </a:p>
@@ -12018,7 +12028,7 @@
             </a:r>
             <a:r>
               <a:rPr lang="en-US" dirty="0" smtClean="0">
-                <a:hlinkClick r:id="rId4"/>
+                <a:hlinkClick r:id="rId5"/>
               </a:rPr>
               <a:t>http://practicefusion.com/careers/</a:t>
             </a:r>
@@ -12064,36 +12074,6 @@
       <p:pic>
         <p:nvPicPr>
           <p:cNvPr id="5" name="Picture 4"/>
-          <p:cNvPicPr>
-            <a:picLocks noChangeAspect="1"/>
-          </p:cNvPicPr>
-          <p:nvPr/>
-        </p:nvPicPr>
-        <p:blipFill>
-          <a:blip r:embed="rId5">
-            <a:extLst>
-              <a:ext uri="{28A0092B-C50C-407E-A947-70E740481C1C}">
-                <a14:useLocalDpi xmlns:a14="http://schemas.microsoft.com/office/drawing/2010/main" val="0"/>
-              </a:ext>
-            </a:extLst>
-          </a:blip>
-          <a:stretch>
-            <a:fillRect/>
-          </a:stretch>
-        </p:blipFill>
-        <p:spPr>
-          <a:xfrm>
-            <a:off x="887683" y="2363231"/>
-            <a:ext cx="431827" cy="431827"/>
-          </a:xfrm>
-          <a:prstGeom prst="rect">
-            <a:avLst/>
-          </a:prstGeom>
-        </p:spPr>
-      </p:pic>
-      <p:pic>
-        <p:nvPicPr>
-          <p:cNvPr id="7" name="Picture 6"/>
           <p:cNvPicPr>
             <a:picLocks noChangeAspect="1"/>
           </p:cNvPicPr>
@@ -12113,8 +12093,8 @@
         </p:blipFill>
         <p:spPr>
           <a:xfrm>
-            <a:off x="887683" y="1785732"/>
-            <a:ext cx="431826" cy="431826"/>
+            <a:off x="887683" y="2363231"/>
+            <a:ext cx="431827" cy="431827"/>
           </a:xfrm>
           <a:prstGeom prst="rect">
             <a:avLst/>
@@ -12123,7 +12103,7 @@
       </p:pic>
       <p:pic>
         <p:nvPicPr>
-          <p:cNvPr id="8" name="Picture 7"/>
+          <p:cNvPr id="7" name="Picture 6"/>
           <p:cNvPicPr>
             <a:picLocks noChangeAspect="1"/>
           </p:cNvPicPr>
@@ -12143,8 +12123,8 @@
         </p:blipFill>
         <p:spPr>
           <a:xfrm>
-            <a:off x="859621" y="4248394"/>
-            <a:ext cx="430480" cy="430480"/>
+            <a:off x="887683" y="1785732"/>
+            <a:ext cx="431826" cy="431826"/>
           </a:xfrm>
           <a:prstGeom prst="rect">
             <a:avLst/>
@@ -12153,37 +12133,7 @@
       </p:pic>
       <p:pic>
         <p:nvPicPr>
-          <p:cNvPr id="15" name="Picture 14"/>
-          <p:cNvPicPr>
-            <a:picLocks noChangeAspect="1"/>
-          </p:cNvPicPr>
-          <p:nvPr/>
-        </p:nvPicPr>
-        <p:blipFill>
-          <a:blip r:embed="rId6">
-            <a:extLst>
-              <a:ext uri="{28A0092B-C50C-407E-A947-70E740481C1C}">
-                <a14:useLocalDpi xmlns:a14="http://schemas.microsoft.com/office/drawing/2010/main" val="0"/>
-              </a:ext>
-            </a:extLst>
-          </a:blip>
-          <a:stretch>
-            <a:fillRect/>
-          </a:stretch>
-        </p:blipFill>
-        <p:spPr>
-          <a:xfrm>
-            <a:off x="859621" y="4774968"/>
-            <a:ext cx="431826" cy="431826"/>
-          </a:xfrm>
-          <a:prstGeom prst="rect">
-            <a:avLst/>
-          </a:prstGeom>
-        </p:spPr>
-      </p:pic>
-      <p:pic>
-        <p:nvPicPr>
-          <p:cNvPr id="9" name="Picture 8"/>
+          <p:cNvPr id="8" name="Picture 7"/>
           <p:cNvPicPr>
             <a:picLocks noChangeAspect="1"/>
           </p:cNvPicPr>
@@ -12203,8 +12153,8 @@
         </p:blipFill>
         <p:spPr>
           <a:xfrm>
-            <a:off x="887682" y="1270660"/>
-            <a:ext cx="418605" cy="418605"/>
+            <a:off x="859621" y="4248394"/>
+            <a:ext cx="430480" cy="430480"/>
           </a:xfrm>
           <a:prstGeom prst="rect">
             <a:avLst/>
@@ -12213,7 +12163,37 @@
       </p:pic>
       <p:pic>
         <p:nvPicPr>
-          <p:cNvPr id="10" name="Picture 9"/>
+          <p:cNvPr id="15" name="Picture 14"/>
+          <p:cNvPicPr>
+            <a:picLocks noChangeAspect="1"/>
+          </p:cNvPicPr>
+          <p:nvPr/>
+        </p:nvPicPr>
+        <p:blipFill>
+          <a:blip r:embed="rId7">
+            <a:extLst>
+              <a:ext uri="{28A0092B-C50C-407E-A947-70E740481C1C}">
+                <a14:useLocalDpi xmlns:a14="http://schemas.microsoft.com/office/drawing/2010/main" val="0"/>
+              </a:ext>
+            </a:extLst>
+          </a:blip>
+          <a:stretch>
+            <a:fillRect/>
+          </a:stretch>
+        </p:blipFill>
+        <p:spPr>
+          <a:xfrm>
+            <a:off x="859621" y="4774968"/>
+            <a:ext cx="431826" cy="431826"/>
+          </a:xfrm>
+          <a:prstGeom prst="rect">
+            <a:avLst/>
+          </a:prstGeom>
+        </p:spPr>
+      </p:pic>
+      <p:pic>
+        <p:nvPicPr>
+          <p:cNvPr id="9" name="Picture 8"/>
           <p:cNvPicPr>
             <a:picLocks noChangeAspect="1"/>
           </p:cNvPicPr>
@@ -12233,6 +12213,36 @@
         </p:blipFill>
         <p:spPr>
           <a:xfrm>
+            <a:off x="887682" y="1270660"/>
+            <a:ext cx="418605" cy="418605"/>
+          </a:xfrm>
+          <a:prstGeom prst="rect">
+            <a:avLst/>
+          </a:prstGeom>
+        </p:spPr>
+      </p:pic>
+      <p:pic>
+        <p:nvPicPr>
+          <p:cNvPr id="10" name="Picture 9"/>
+          <p:cNvPicPr>
+            <a:picLocks noChangeAspect="1"/>
+          </p:cNvPicPr>
+          <p:nvPr/>
+        </p:nvPicPr>
+        <p:blipFill>
+          <a:blip r:embed="rId10">
+            <a:extLst>
+              <a:ext uri="{28A0092B-C50C-407E-A947-70E740481C1C}">
+                <a14:useLocalDpi xmlns:a14="http://schemas.microsoft.com/office/drawing/2010/main" val="0"/>
+              </a:ext>
+            </a:extLst>
+          </a:blip>
+          <a:stretch>
+            <a:fillRect/>
+          </a:stretch>
+        </p:blipFill>
+        <p:spPr>
+          <a:xfrm>
             <a:off x="864075" y="3345027"/>
             <a:ext cx="431826" cy="431826"/>
           </a:xfrm>
@@ -12250,7 +12260,7 @@
           <p:nvPr/>
         </p:nvPicPr>
         <p:blipFill>
-          <a:blip r:embed="rId10"/>
+          <a:blip r:embed="rId11"/>
           <a:stretch>
             <a:fillRect/>
           </a:stretch>

</xml_diff>